<commit_message>
add Panel board production gerber files
</commit_message>
<xml_diff>
--- a/Docs/Production Guide.pptx
+++ b/Docs/Production Guide.pptx
@@ -8,6 +8,8 @@
     <p:sldId id="258" r:id="rId2"/>
     <p:sldId id="261" r:id="rId3"/>
     <p:sldId id="259" r:id="rId4"/>
+    <p:sldId id="263" r:id="rId5"/>
+    <p:sldId id="262" r:id="rId6"/>
   </p:sldIdLst>
   <p:sldSz cx="12192000" cy="6858000"/>
   <p:notesSz cx="6858000" cy="9144000"/>
@@ -261,7 +263,7 @@
           <a:p>
             <a:fld id="{3D50C6EF-53C5-497C-9D49-88F8428D505E}" type="datetimeFigureOut">
               <a:rPr lang="en-US" smtClean="0"/>
-              <a:t>7/12/2023</a:t>
+              <a:t>7/13/2023</a:t>
             </a:fld>
             <a:endParaRPr lang="en-US"/>
           </a:p>
@@ -459,7 +461,7 @@
           <a:p>
             <a:fld id="{3D50C6EF-53C5-497C-9D49-88F8428D505E}" type="datetimeFigureOut">
               <a:rPr lang="en-US" smtClean="0"/>
-              <a:t>7/12/2023</a:t>
+              <a:t>7/13/2023</a:t>
             </a:fld>
             <a:endParaRPr lang="en-US"/>
           </a:p>
@@ -667,7 +669,7 @@
           <a:p>
             <a:fld id="{3D50C6EF-53C5-497C-9D49-88F8428D505E}" type="datetimeFigureOut">
               <a:rPr lang="en-US" smtClean="0"/>
-              <a:t>7/12/2023</a:t>
+              <a:t>7/13/2023</a:t>
             </a:fld>
             <a:endParaRPr lang="en-US"/>
           </a:p>
@@ -865,7 +867,7 @@
           <a:p>
             <a:fld id="{3D50C6EF-53C5-497C-9D49-88F8428D505E}" type="datetimeFigureOut">
               <a:rPr lang="en-US" smtClean="0"/>
-              <a:t>7/12/2023</a:t>
+              <a:t>7/13/2023</a:t>
             </a:fld>
             <a:endParaRPr lang="en-US"/>
           </a:p>
@@ -1140,7 +1142,7 @@
           <a:p>
             <a:fld id="{3D50C6EF-53C5-497C-9D49-88F8428D505E}" type="datetimeFigureOut">
               <a:rPr lang="en-US" smtClean="0"/>
-              <a:t>7/12/2023</a:t>
+              <a:t>7/13/2023</a:t>
             </a:fld>
             <a:endParaRPr lang="en-US"/>
           </a:p>
@@ -1405,7 +1407,7 @@
           <a:p>
             <a:fld id="{3D50C6EF-53C5-497C-9D49-88F8428D505E}" type="datetimeFigureOut">
               <a:rPr lang="en-US" smtClean="0"/>
-              <a:t>7/12/2023</a:t>
+              <a:t>7/13/2023</a:t>
             </a:fld>
             <a:endParaRPr lang="en-US"/>
           </a:p>
@@ -1817,7 +1819,7 @@
           <a:p>
             <a:fld id="{3D50C6EF-53C5-497C-9D49-88F8428D505E}" type="datetimeFigureOut">
               <a:rPr lang="en-US" smtClean="0"/>
-              <a:t>7/12/2023</a:t>
+              <a:t>7/13/2023</a:t>
             </a:fld>
             <a:endParaRPr lang="en-US"/>
           </a:p>
@@ -1958,7 +1960,7 @@
           <a:p>
             <a:fld id="{3D50C6EF-53C5-497C-9D49-88F8428D505E}" type="datetimeFigureOut">
               <a:rPr lang="en-US" smtClean="0"/>
-              <a:t>7/12/2023</a:t>
+              <a:t>7/13/2023</a:t>
             </a:fld>
             <a:endParaRPr lang="en-US"/>
           </a:p>
@@ -2071,7 +2073,7 @@
           <a:p>
             <a:fld id="{3D50C6EF-53C5-497C-9D49-88F8428D505E}" type="datetimeFigureOut">
               <a:rPr lang="en-US" smtClean="0"/>
-              <a:t>7/12/2023</a:t>
+              <a:t>7/13/2023</a:t>
             </a:fld>
             <a:endParaRPr lang="en-US"/>
           </a:p>
@@ -2382,7 +2384,7 @@
           <a:p>
             <a:fld id="{3D50C6EF-53C5-497C-9D49-88F8428D505E}" type="datetimeFigureOut">
               <a:rPr lang="en-US" smtClean="0"/>
-              <a:t>7/12/2023</a:t>
+              <a:t>7/13/2023</a:t>
             </a:fld>
             <a:endParaRPr lang="en-US"/>
           </a:p>
@@ -2670,7 +2672,7 @@
           <a:p>
             <a:fld id="{3D50C6EF-53C5-497C-9D49-88F8428D505E}" type="datetimeFigureOut">
               <a:rPr lang="en-US" smtClean="0"/>
-              <a:t>7/12/2023</a:t>
+              <a:t>7/13/2023</a:t>
             </a:fld>
             <a:endParaRPr lang="en-US"/>
           </a:p>
@@ -2911,7 +2913,7 @@
           <a:p>
             <a:fld id="{3D50C6EF-53C5-497C-9D49-88F8428D505E}" type="datetimeFigureOut">
               <a:rPr lang="en-US" smtClean="0"/>
-              <a:t>7/12/2023</a:t>
+              <a:t>7/13/2023</a:t>
             </a:fld>
             <a:endParaRPr lang="en-US"/>
           </a:p>
@@ -3397,8 +3399,8 @@
         </p:nvSpPr>
         <p:spPr>
           <a:xfrm>
-            <a:off x="4552131" y="544533"/>
-            <a:ext cx="2971800" cy="620993"/>
+            <a:off x="4061745" y="537101"/>
+            <a:ext cx="3965418" cy="620993"/>
           </a:xfrm>
         </p:spPr>
         <p:txBody>
@@ -3414,7 +3416,7 @@
                   <a:schemeClr val="bg1"/>
                 </a:solidFill>
               </a:rPr>
-              <a:t>PCB Design</a:t>
+              <a:t>Single board PCB Design</a:t>
             </a:r>
           </a:p>
         </p:txBody>
@@ -3619,15 +3621,15 @@
           <a:p>
             <a:pPr algn="ctr"/>
             <a:r>
-              <a:rPr lang="en-US" dirty="0"/>
+              <a:rPr lang="en-US" b="1" dirty="0"/>
               <a:t>6DP to </a:t>
             </a:r>
             <a:r>
-              <a:rPr lang="en-US" dirty="0" err="1"/>
+              <a:rPr lang="en-US" b="1" dirty="0" err="1"/>
               <a:t>OptoBoard</a:t>
             </a:r>
             <a:r>
-              <a:rPr lang="en-US" dirty="0"/>
+              <a:rPr lang="en-US" b="1" dirty="0"/>
               <a:t> Adapter Card</a:t>
             </a:r>
           </a:p>
@@ -3744,8 +3746,8 @@
           <a:p>
             <a:pPr algn="ctr"/>
             <a:r>
-              <a:rPr lang="en-US" dirty="0"/>
-              <a:t>After Assembly</a:t>
+              <a:rPr lang="en-US" b="1" dirty="0"/>
+              <a:t>Single board Assembly</a:t>
             </a:r>
           </a:p>
         </p:txBody>
@@ -3985,6 +3987,216 @@
               <a:t>ERF8-050-01-L-D-EM2-TR  connector</a:t>
             </a:r>
             <a:endParaRPr lang="en-US" sz="1000" b="1" dirty="0"/>
+          </a:p>
+        </p:txBody>
+      </p:sp>
+      <p:sp>
+        <p:nvSpPr>
+          <p:cNvPr id="3" name="TextBox 2">
+            <a:extLst>
+              <a:ext uri="{FF2B5EF4-FFF2-40B4-BE49-F238E27FC236}">
+                <a16:creationId xmlns:a16="http://schemas.microsoft.com/office/drawing/2014/main" id="{CA69AA07-C75F-4AC6-BD36-1786A25FAB17}"/>
+              </a:ext>
+            </a:extLst>
+          </p:cNvPr>
+          <p:cNvSpPr txBox="1"/>
+          <p:nvPr/>
+        </p:nvSpPr>
+        <p:spPr>
+          <a:xfrm>
+            <a:off x="1933532" y="2830152"/>
+            <a:ext cx="445956" cy="369332"/>
+          </a:xfrm>
+          <a:prstGeom prst="rect">
+            <a:avLst/>
+          </a:prstGeom>
+          <a:noFill/>
+        </p:spPr>
+        <p:txBody>
+          <a:bodyPr wrap="none" rtlCol="0">
+            <a:spAutoFit/>
+          </a:bodyPr>
+          <a:lstStyle/>
+          <a:p>
+            <a:r>
+              <a:rPr lang="en-US" dirty="0"/>
+              <a:t>DP</a:t>
+            </a:r>
+          </a:p>
+        </p:txBody>
+      </p:sp>
+      <p:sp>
+        <p:nvSpPr>
+          <p:cNvPr id="13" name="TextBox 12">
+            <a:extLst>
+              <a:ext uri="{FF2B5EF4-FFF2-40B4-BE49-F238E27FC236}">
+                <a16:creationId xmlns:a16="http://schemas.microsoft.com/office/drawing/2014/main" id="{F7A29BA9-BE6F-47DB-A2C9-D81EB190CEAE}"/>
+              </a:ext>
+            </a:extLst>
+          </p:cNvPr>
+          <p:cNvSpPr txBox="1"/>
+          <p:nvPr/>
+        </p:nvSpPr>
+        <p:spPr>
+          <a:xfrm>
+            <a:off x="3508260" y="2830152"/>
+            <a:ext cx="445956" cy="369332"/>
+          </a:xfrm>
+          <a:prstGeom prst="rect">
+            <a:avLst/>
+          </a:prstGeom>
+          <a:noFill/>
+        </p:spPr>
+        <p:txBody>
+          <a:bodyPr wrap="none" rtlCol="0">
+            <a:spAutoFit/>
+          </a:bodyPr>
+          <a:lstStyle/>
+          <a:p>
+            <a:r>
+              <a:rPr lang="en-US" dirty="0"/>
+              <a:t>DP</a:t>
+            </a:r>
+          </a:p>
+        </p:txBody>
+      </p:sp>
+      <p:sp>
+        <p:nvSpPr>
+          <p:cNvPr id="14" name="TextBox 13">
+            <a:extLst>
+              <a:ext uri="{FF2B5EF4-FFF2-40B4-BE49-F238E27FC236}">
+                <a16:creationId xmlns:a16="http://schemas.microsoft.com/office/drawing/2014/main" id="{1EBB53A6-4C73-4F3D-9041-5C8ECF2AF9F2}"/>
+              </a:ext>
+            </a:extLst>
+          </p:cNvPr>
+          <p:cNvSpPr txBox="1"/>
+          <p:nvPr/>
+        </p:nvSpPr>
+        <p:spPr>
+          <a:xfrm>
+            <a:off x="5082988" y="2830152"/>
+            <a:ext cx="445956" cy="369332"/>
+          </a:xfrm>
+          <a:prstGeom prst="rect">
+            <a:avLst/>
+          </a:prstGeom>
+          <a:noFill/>
+        </p:spPr>
+        <p:txBody>
+          <a:bodyPr wrap="none" rtlCol="0">
+            <a:spAutoFit/>
+          </a:bodyPr>
+          <a:lstStyle/>
+          <a:p>
+            <a:r>
+              <a:rPr lang="en-US" dirty="0"/>
+              <a:t>DP</a:t>
+            </a:r>
+          </a:p>
+        </p:txBody>
+      </p:sp>
+      <p:sp>
+        <p:nvSpPr>
+          <p:cNvPr id="16" name="TextBox 15">
+            <a:extLst>
+              <a:ext uri="{FF2B5EF4-FFF2-40B4-BE49-F238E27FC236}">
+                <a16:creationId xmlns:a16="http://schemas.microsoft.com/office/drawing/2014/main" id="{74117A0F-0786-465B-A711-0710B1AB1F2D}"/>
+              </a:ext>
+            </a:extLst>
+          </p:cNvPr>
+          <p:cNvSpPr txBox="1"/>
+          <p:nvPr/>
+        </p:nvSpPr>
+        <p:spPr>
+          <a:xfrm>
+            <a:off x="6657716" y="2830152"/>
+            <a:ext cx="445956" cy="369332"/>
+          </a:xfrm>
+          <a:prstGeom prst="rect">
+            <a:avLst/>
+          </a:prstGeom>
+          <a:noFill/>
+        </p:spPr>
+        <p:txBody>
+          <a:bodyPr wrap="none" rtlCol="0">
+            <a:spAutoFit/>
+          </a:bodyPr>
+          <a:lstStyle/>
+          <a:p>
+            <a:r>
+              <a:rPr lang="en-US" dirty="0"/>
+              <a:t>DP</a:t>
+            </a:r>
+          </a:p>
+        </p:txBody>
+      </p:sp>
+      <p:sp>
+        <p:nvSpPr>
+          <p:cNvPr id="17" name="TextBox 16">
+            <a:extLst>
+              <a:ext uri="{FF2B5EF4-FFF2-40B4-BE49-F238E27FC236}">
+                <a16:creationId xmlns:a16="http://schemas.microsoft.com/office/drawing/2014/main" id="{24C48359-2492-484C-8213-15210016EA73}"/>
+              </a:ext>
+            </a:extLst>
+          </p:cNvPr>
+          <p:cNvSpPr txBox="1"/>
+          <p:nvPr/>
+        </p:nvSpPr>
+        <p:spPr>
+          <a:xfrm>
+            <a:off x="8232444" y="2830152"/>
+            <a:ext cx="445956" cy="369332"/>
+          </a:xfrm>
+          <a:prstGeom prst="rect">
+            <a:avLst/>
+          </a:prstGeom>
+          <a:noFill/>
+        </p:spPr>
+        <p:txBody>
+          <a:bodyPr wrap="none" rtlCol="0">
+            <a:spAutoFit/>
+          </a:bodyPr>
+          <a:lstStyle/>
+          <a:p>
+            <a:r>
+              <a:rPr lang="en-US" dirty="0"/>
+              <a:t>DP</a:t>
+            </a:r>
+          </a:p>
+        </p:txBody>
+      </p:sp>
+      <p:sp>
+        <p:nvSpPr>
+          <p:cNvPr id="18" name="TextBox 17">
+            <a:extLst>
+              <a:ext uri="{FF2B5EF4-FFF2-40B4-BE49-F238E27FC236}">
+                <a16:creationId xmlns:a16="http://schemas.microsoft.com/office/drawing/2014/main" id="{C5E0DEB7-57A6-463C-A0CE-8361FCC70C6C}"/>
+              </a:ext>
+            </a:extLst>
+          </p:cNvPr>
+          <p:cNvSpPr txBox="1"/>
+          <p:nvPr/>
+        </p:nvSpPr>
+        <p:spPr>
+          <a:xfrm>
+            <a:off x="9807172" y="2830152"/>
+            <a:ext cx="445956" cy="369332"/>
+          </a:xfrm>
+          <a:prstGeom prst="rect">
+            <a:avLst/>
+          </a:prstGeom>
+          <a:noFill/>
+        </p:spPr>
+        <p:txBody>
+          <a:bodyPr wrap="none" rtlCol="0">
+            <a:spAutoFit/>
+          </a:bodyPr>
+          <a:lstStyle/>
+          <a:p>
+            <a:r>
+              <a:rPr lang="en-US" dirty="0"/>
+              <a:t>DP</a:t>
+            </a:r>
           </a:p>
         </p:txBody>
       </p:sp>
@@ -4171,7 +4383,7 @@
           <a:p>
             <a:pPr algn="ctr"/>
             <a:r>
-              <a:rPr lang="en-US" dirty="0"/>
+              <a:rPr lang="en-US" b="1" dirty="0"/>
               <a:t>PCB production requirements</a:t>
             </a:r>
           </a:p>
@@ -4360,6 +4572,1703 @@
     <p:extLst>
       <p:ext uri="{BB962C8B-B14F-4D97-AF65-F5344CB8AC3E}">
         <p14:creationId xmlns:p14="http://schemas.microsoft.com/office/powerpoint/2010/main" val="2352683445"/>
+      </p:ext>
+    </p:extLst>
+  </p:cSld>
+  <p:clrMapOvr>
+    <a:masterClrMapping/>
+  </p:clrMapOvr>
+</p:sld>
+</file>
+
+<file path=ppt/slides/slide4.xml><?xml version="1.0" encoding="utf-8"?>
+<p:sld xmlns:a="http://schemas.openxmlformats.org/drawingml/2006/main" xmlns:r="http://schemas.openxmlformats.org/officeDocument/2006/relationships" xmlns:p="http://schemas.openxmlformats.org/presentationml/2006/main">
+  <p:cSld>
+    <p:spTree>
+      <p:nvGrpSpPr>
+        <p:cNvPr id="1" name=""/>
+        <p:cNvGrpSpPr/>
+        <p:nvPr/>
+      </p:nvGrpSpPr>
+      <p:grpSpPr>
+        <a:xfrm>
+          <a:off x="0" y="0"/>
+          <a:ext cx="0" cy="0"/>
+          <a:chOff x="0" y="0"/>
+          <a:chExt cx="0" cy="0"/>
+        </a:xfrm>
+      </p:grpSpPr>
+      <p:sp>
+        <p:nvSpPr>
+          <p:cNvPr id="8" name="Rectangle: Rounded Corners 7">
+            <a:extLst>
+              <a:ext uri="{FF2B5EF4-FFF2-40B4-BE49-F238E27FC236}">
+                <a16:creationId xmlns:a16="http://schemas.microsoft.com/office/drawing/2014/main" id="{7864F8F3-6999-461F-B47B-54216F5CE7E3}"/>
+              </a:ext>
+            </a:extLst>
+          </p:cNvPr>
+          <p:cNvSpPr/>
+          <p:nvPr/>
+        </p:nvSpPr>
+        <p:spPr>
+          <a:xfrm>
+            <a:off x="134471" y="627529"/>
+            <a:ext cx="11905129" cy="6104965"/>
+          </a:xfrm>
+          <a:prstGeom prst="roundRect">
+            <a:avLst>
+              <a:gd name="adj" fmla="val 8297"/>
+            </a:avLst>
+          </a:prstGeom>
+          <a:solidFill>
+            <a:srgbClr val="B3B3CD"/>
+          </a:solidFill>
+        </p:spPr>
+        <p:style>
+          <a:lnRef idx="2">
+            <a:schemeClr val="accent1">
+              <a:shade val="50000"/>
+            </a:schemeClr>
+          </a:lnRef>
+          <a:fillRef idx="1">
+            <a:schemeClr val="accent1"/>
+          </a:fillRef>
+          <a:effectRef idx="0">
+            <a:schemeClr val="accent1"/>
+          </a:effectRef>
+          <a:fontRef idx="minor">
+            <a:schemeClr val="lt1"/>
+          </a:fontRef>
+        </p:style>
+        <p:txBody>
+          <a:bodyPr rtlCol="0" anchor="ctr"/>
+          <a:lstStyle/>
+          <a:p>
+            <a:pPr algn="ctr"/>
+            <a:endParaRPr lang="en-US"/>
+          </a:p>
+        </p:txBody>
+      </p:sp>
+      <p:sp>
+        <p:nvSpPr>
+          <p:cNvPr id="2" name="Title 1">
+            <a:extLst>
+              <a:ext uri="{FF2B5EF4-FFF2-40B4-BE49-F238E27FC236}">
+                <a16:creationId xmlns:a16="http://schemas.microsoft.com/office/drawing/2014/main" id="{321759F6-9CB9-4ACF-B30F-2AAFED86D3E8}"/>
+              </a:ext>
+            </a:extLst>
+          </p:cNvPr>
+          <p:cNvSpPr>
+            <a:spLocks noGrp="1"/>
+          </p:cNvSpPr>
+          <p:nvPr>
+            <p:ph type="title"/>
+          </p:nvPr>
+        </p:nvSpPr>
+        <p:spPr>
+          <a:xfrm>
+            <a:off x="4509588" y="-40200"/>
+            <a:ext cx="3169025" cy="650069"/>
+          </a:xfrm>
+        </p:spPr>
+        <p:txBody>
+          <a:bodyPr>
+            <a:normAutofit fontScale="90000"/>
+          </a:bodyPr>
+          <a:lstStyle/>
+          <a:p>
+            <a:r>
+              <a:rPr lang="en-US" b="1" dirty="0"/>
+              <a:t>Panel design</a:t>
+            </a:r>
+          </a:p>
+        </p:txBody>
+      </p:sp>
+      <p:sp>
+        <p:nvSpPr>
+          <p:cNvPr id="10" name="TextBox 9">
+            <a:extLst>
+              <a:ext uri="{FF2B5EF4-FFF2-40B4-BE49-F238E27FC236}">
+                <a16:creationId xmlns:a16="http://schemas.microsoft.com/office/drawing/2014/main" id="{59CE69E2-CAB2-422C-A9C9-A541E7BA8141}"/>
+              </a:ext>
+            </a:extLst>
+          </p:cNvPr>
+          <p:cNvSpPr txBox="1"/>
+          <p:nvPr/>
+        </p:nvSpPr>
+        <p:spPr>
+          <a:xfrm>
+            <a:off x="5340259" y="3820668"/>
+            <a:ext cx="1482018" cy="369332"/>
+          </a:xfrm>
+          <a:prstGeom prst="rect">
+            <a:avLst/>
+          </a:prstGeom>
+          <a:noFill/>
+        </p:spPr>
+        <p:txBody>
+          <a:bodyPr wrap="square" rtlCol="0">
+            <a:spAutoFit/>
+          </a:bodyPr>
+          <a:lstStyle/>
+          <a:p>
+            <a:pPr algn="ctr"/>
+            <a:r>
+              <a:rPr lang="en-US" dirty="0">
+                <a:solidFill>
+                  <a:schemeClr val="bg1"/>
+                </a:solidFill>
+              </a:rPr>
+              <a:t>Bottom View</a:t>
+            </a:r>
+          </a:p>
+        </p:txBody>
+      </p:sp>
+      <p:sp>
+        <p:nvSpPr>
+          <p:cNvPr id="11" name="TextBox 10">
+            <a:extLst>
+              <a:ext uri="{FF2B5EF4-FFF2-40B4-BE49-F238E27FC236}">
+                <a16:creationId xmlns:a16="http://schemas.microsoft.com/office/drawing/2014/main" id="{C2185B35-F98C-4996-87E3-6163D6EAA496}"/>
+              </a:ext>
+            </a:extLst>
+          </p:cNvPr>
+          <p:cNvSpPr txBox="1"/>
+          <p:nvPr/>
+        </p:nvSpPr>
+        <p:spPr>
+          <a:xfrm>
+            <a:off x="5546474" y="718161"/>
+            <a:ext cx="1095255" cy="369332"/>
+          </a:xfrm>
+          <a:prstGeom prst="rect">
+            <a:avLst/>
+          </a:prstGeom>
+          <a:noFill/>
+        </p:spPr>
+        <p:txBody>
+          <a:bodyPr wrap="square" rtlCol="0">
+            <a:spAutoFit/>
+          </a:bodyPr>
+          <a:lstStyle/>
+          <a:p>
+            <a:pPr algn="ctr"/>
+            <a:r>
+              <a:rPr lang="en-US" dirty="0">
+                <a:solidFill>
+                  <a:schemeClr val="bg1"/>
+                </a:solidFill>
+              </a:rPr>
+              <a:t>Top View</a:t>
+            </a:r>
+          </a:p>
+        </p:txBody>
+      </p:sp>
+      <p:pic>
+        <p:nvPicPr>
+          <p:cNvPr id="12" name="Picture 11">
+            <a:extLst>
+              <a:ext uri="{FF2B5EF4-FFF2-40B4-BE49-F238E27FC236}">
+                <a16:creationId xmlns:a16="http://schemas.microsoft.com/office/drawing/2014/main" id="{5E341B01-DF53-4454-9888-5750CB66E890}"/>
+              </a:ext>
+            </a:extLst>
+          </p:cNvPr>
+          <p:cNvPicPr>
+            <a:picLocks noChangeAspect="1"/>
+          </p:cNvPicPr>
+          <p:nvPr/>
+        </p:nvPicPr>
+        <p:blipFill>
+          <a:blip r:embed="rId2"/>
+          <a:stretch>
+            <a:fillRect/>
+          </a:stretch>
+        </p:blipFill>
+        <p:spPr>
+          <a:xfrm>
+            <a:off x="592893" y="1122049"/>
+            <a:ext cx="11002419" cy="2120123"/>
+          </a:xfrm>
+          <a:prstGeom prst="rect">
+            <a:avLst/>
+          </a:prstGeom>
+        </p:spPr>
+      </p:pic>
+      <p:pic>
+        <p:nvPicPr>
+          <p:cNvPr id="13" name="Picture 12">
+            <a:extLst>
+              <a:ext uri="{FF2B5EF4-FFF2-40B4-BE49-F238E27FC236}">
+                <a16:creationId xmlns:a16="http://schemas.microsoft.com/office/drawing/2014/main" id="{41AF0A9E-0BF3-43DF-8817-2099608B3EFF}"/>
+              </a:ext>
+            </a:extLst>
+          </p:cNvPr>
+          <p:cNvPicPr>
+            <a:picLocks noChangeAspect="1"/>
+          </p:cNvPicPr>
+          <p:nvPr/>
+        </p:nvPicPr>
+        <p:blipFill>
+          <a:blip r:embed="rId3"/>
+          <a:stretch>
+            <a:fillRect/>
+          </a:stretch>
+        </p:blipFill>
+        <p:spPr>
+          <a:xfrm>
+            <a:off x="614363" y="4223984"/>
+            <a:ext cx="10980949" cy="2110142"/>
+          </a:xfrm>
+          <a:prstGeom prst="rect">
+            <a:avLst/>
+          </a:prstGeom>
+        </p:spPr>
+      </p:pic>
+    </p:spTree>
+    <p:extLst>
+      <p:ext uri="{BB962C8B-B14F-4D97-AF65-F5344CB8AC3E}">
+        <p14:creationId xmlns:p14="http://schemas.microsoft.com/office/powerpoint/2010/main" val="2991548143"/>
+      </p:ext>
+    </p:extLst>
+  </p:cSld>
+  <p:clrMapOvr>
+    <a:masterClrMapping/>
+  </p:clrMapOvr>
+</p:sld>
+</file>
+
+<file path=ppt/slides/slide5.xml><?xml version="1.0" encoding="utf-8"?>
+<p:sld xmlns:a="http://schemas.openxmlformats.org/drawingml/2006/main" xmlns:r="http://schemas.openxmlformats.org/officeDocument/2006/relationships" xmlns:p="http://schemas.openxmlformats.org/presentationml/2006/main">
+  <p:cSld>
+    <p:spTree>
+      <p:nvGrpSpPr>
+        <p:cNvPr id="1" name=""/>
+        <p:cNvGrpSpPr/>
+        <p:nvPr/>
+      </p:nvGrpSpPr>
+      <p:grpSpPr>
+        <a:xfrm>
+          <a:off x="0" y="0"/>
+          <a:ext cx="0" cy="0"/>
+          <a:chOff x="0" y="0"/>
+          <a:chExt cx="0" cy="0"/>
+        </a:xfrm>
+      </p:grpSpPr>
+      <p:sp>
+        <p:nvSpPr>
+          <p:cNvPr id="10" name="Rectangle: Rounded Corners 9">
+            <a:extLst>
+              <a:ext uri="{FF2B5EF4-FFF2-40B4-BE49-F238E27FC236}">
+                <a16:creationId xmlns:a16="http://schemas.microsoft.com/office/drawing/2014/main" id="{9BB5557E-938C-44A6-BFA8-8B3AD627732C}"/>
+              </a:ext>
+            </a:extLst>
+          </p:cNvPr>
+          <p:cNvSpPr/>
+          <p:nvPr/>
+        </p:nvSpPr>
+        <p:spPr>
+          <a:xfrm>
+            <a:off x="134471" y="627529"/>
+            <a:ext cx="11905129" cy="6104965"/>
+          </a:xfrm>
+          <a:prstGeom prst="roundRect">
+            <a:avLst>
+              <a:gd name="adj" fmla="val 8297"/>
+            </a:avLst>
+          </a:prstGeom>
+          <a:solidFill>
+            <a:srgbClr val="B3B3CD"/>
+          </a:solidFill>
+        </p:spPr>
+        <p:style>
+          <a:lnRef idx="2">
+            <a:schemeClr val="accent1">
+              <a:shade val="50000"/>
+            </a:schemeClr>
+          </a:lnRef>
+          <a:fillRef idx="1">
+            <a:schemeClr val="accent1"/>
+          </a:fillRef>
+          <a:effectRef idx="0">
+            <a:schemeClr val="accent1"/>
+          </a:effectRef>
+          <a:fontRef idx="minor">
+            <a:schemeClr val="lt1"/>
+          </a:fontRef>
+        </p:style>
+        <p:txBody>
+          <a:bodyPr rtlCol="0" anchor="ctr"/>
+          <a:lstStyle/>
+          <a:p>
+            <a:pPr algn="ctr"/>
+            <a:endParaRPr lang="en-US"/>
+          </a:p>
+        </p:txBody>
+      </p:sp>
+      <p:sp>
+        <p:nvSpPr>
+          <p:cNvPr id="2" name="Title 1">
+            <a:extLst>
+              <a:ext uri="{FF2B5EF4-FFF2-40B4-BE49-F238E27FC236}">
+                <a16:creationId xmlns:a16="http://schemas.microsoft.com/office/drawing/2014/main" id="{68817FB0-E017-4D60-AF88-A5CA004B036D}"/>
+              </a:ext>
+            </a:extLst>
+          </p:cNvPr>
+          <p:cNvSpPr>
+            <a:spLocks noGrp="1"/>
+          </p:cNvSpPr>
+          <p:nvPr>
+            <p:ph type="title"/>
+          </p:nvPr>
+        </p:nvSpPr>
+        <p:spPr>
+          <a:xfrm>
+            <a:off x="4201391" y="11805"/>
+            <a:ext cx="3789218" cy="493857"/>
+          </a:xfrm>
+        </p:spPr>
+        <p:txBody>
+          <a:bodyPr>
+            <a:normAutofit fontScale="90000"/>
+          </a:bodyPr>
+          <a:lstStyle/>
+          <a:p>
+            <a:pPr algn="ctr"/>
+            <a:r>
+              <a:rPr lang="en-US" b="1" dirty="0"/>
+              <a:t>Panel assembly</a:t>
+            </a:r>
+          </a:p>
+        </p:txBody>
+      </p:sp>
+      <p:pic>
+        <p:nvPicPr>
+          <p:cNvPr id="7" name="Picture 6">
+            <a:extLst>
+              <a:ext uri="{FF2B5EF4-FFF2-40B4-BE49-F238E27FC236}">
+                <a16:creationId xmlns:a16="http://schemas.microsoft.com/office/drawing/2014/main" id="{2DDF70F0-3271-44FA-9B72-AECD2FFC1A36}"/>
+              </a:ext>
+            </a:extLst>
+          </p:cNvPr>
+          <p:cNvPicPr>
+            <a:picLocks noChangeAspect="1"/>
+          </p:cNvPicPr>
+          <p:nvPr/>
+        </p:nvPicPr>
+        <p:blipFill>
+          <a:blip r:embed="rId2"/>
+          <a:stretch>
+            <a:fillRect/>
+          </a:stretch>
+        </p:blipFill>
+        <p:spPr>
+          <a:xfrm>
+            <a:off x="592893" y="871262"/>
+            <a:ext cx="11002419" cy="2599780"/>
+          </a:xfrm>
+          <a:prstGeom prst="rect">
+            <a:avLst/>
+          </a:prstGeom>
+        </p:spPr>
+      </p:pic>
+      <p:pic>
+        <p:nvPicPr>
+          <p:cNvPr id="9" name="Picture 8">
+            <a:extLst>
+              <a:ext uri="{FF2B5EF4-FFF2-40B4-BE49-F238E27FC236}">
+                <a16:creationId xmlns:a16="http://schemas.microsoft.com/office/drawing/2014/main" id="{7558AC86-4BD0-43E8-A746-AF2469944B33}"/>
+              </a:ext>
+            </a:extLst>
+          </p:cNvPr>
+          <p:cNvPicPr>
+            <a:picLocks noChangeAspect="1"/>
+          </p:cNvPicPr>
+          <p:nvPr/>
+        </p:nvPicPr>
+        <p:blipFill>
+          <a:blip r:embed="rId3"/>
+          <a:stretch>
+            <a:fillRect/>
+          </a:stretch>
+        </p:blipFill>
+        <p:spPr>
+          <a:xfrm>
+            <a:off x="565997" y="3964803"/>
+            <a:ext cx="11032546" cy="2606327"/>
+          </a:xfrm>
+          <a:prstGeom prst="rect">
+            <a:avLst/>
+          </a:prstGeom>
+        </p:spPr>
+      </p:pic>
+      <p:sp>
+        <p:nvSpPr>
+          <p:cNvPr id="11" name="TextBox 10">
+            <a:extLst>
+              <a:ext uri="{FF2B5EF4-FFF2-40B4-BE49-F238E27FC236}">
+                <a16:creationId xmlns:a16="http://schemas.microsoft.com/office/drawing/2014/main" id="{1F6D2839-0025-414E-A012-5D412087639A}"/>
+              </a:ext>
+            </a:extLst>
+          </p:cNvPr>
+          <p:cNvSpPr txBox="1"/>
+          <p:nvPr/>
+        </p:nvSpPr>
+        <p:spPr>
+          <a:xfrm>
+            <a:off x="5546474" y="718161"/>
+            <a:ext cx="1095255" cy="369332"/>
+          </a:xfrm>
+          <a:prstGeom prst="rect">
+            <a:avLst/>
+          </a:prstGeom>
+          <a:noFill/>
+        </p:spPr>
+        <p:txBody>
+          <a:bodyPr wrap="square" rtlCol="0">
+            <a:spAutoFit/>
+          </a:bodyPr>
+          <a:lstStyle/>
+          <a:p>
+            <a:pPr algn="ctr"/>
+            <a:r>
+              <a:rPr lang="en-US" dirty="0">
+                <a:solidFill>
+                  <a:schemeClr val="bg1"/>
+                </a:solidFill>
+              </a:rPr>
+              <a:t>Top View</a:t>
+            </a:r>
+          </a:p>
+        </p:txBody>
+      </p:sp>
+      <p:sp>
+        <p:nvSpPr>
+          <p:cNvPr id="12" name="TextBox 11">
+            <a:extLst>
+              <a:ext uri="{FF2B5EF4-FFF2-40B4-BE49-F238E27FC236}">
+                <a16:creationId xmlns:a16="http://schemas.microsoft.com/office/drawing/2014/main" id="{6D9421EB-E5B8-4845-8600-673A4D854A00}"/>
+              </a:ext>
+            </a:extLst>
+          </p:cNvPr>
+          <p:cNvSpPr txBox="1"/>
+          <p:nvPr/>
+        </p:nvSpPr>
+        <p:spPr>
+          <a:xfrm>
+            <a:off x="5340259" y="3820668"/>
+            <a:ext cx="1482018" cy="369332"/>
+          </a:xfrm>
+          <a:prstGeom prst="rect">
+            <a:avLst/>
+          </a:prstGeom>
+          <a:noFill/>
+        </p:spPr>
+        <p:txBody>
+          <a:bodyPr wrap="square" rtlCol="0">
+            <a:spAutoFit/>
+          </a:bodyPr>
+          <a:lstStyle/>
+          <a:p>
+            <a:pPr algn="ctr"/>
+            <a:r>
+              <a:rPr lang="en-US" dirty="0">
+                <a:solidFill>
+                  <a:schemeClr val="bg1"/>
+                </a:solidFill>
+              </a:rPr>
+              <a:t>Bottom View</a:t>
+            </a:r>
+          </a:p>
+        </p:txBody>
+      </p:sp>
+      <p:sp>
+        <p:nvSpPr>
+          <p:cNvPr id="8" name="TextBox 7">
+            <a:extLst>
+              <a:ext uri="{FF2B5EF4-FFF2-40B4-BE49-F238E27FC236}">
+                <a16:creationId xmlns:a16="http://schemas.microsoft.com/office/drawing/2014/main" id="{CC6C0C4B-8376-44A3-92AA-181DAD988254}"/>
+              </a:ext>
+            </a:extLst>
+          </p:cNvPr>
+          <p:cNvSpPr txBox="1"/>
+          <p:nvPr/>
+        </p:nvSpPr>
+        <p:spPr>
+          <a:xfrm>
+            <a:off x="1243250" y="1742168"/>
+            <a:ext cx="445956" cy="369332"/>
+          </a:xfrm>
+          <a:prstGeom prst="rect">
+            <a:avLst/>
+          </a:prstGeom>
+          <a:noFill/>
+        </p:spPr>
+        <p:txBody>
+          <a:bodyPr wrap="none" rtlCol="0">
+            <a:spAutoFit/>
+          </a:bodyPr>
+          <a:lstStyle/>
+          <a:p>
+            <a:r>
+              <a:rPr lang="en-US" dirty="0"/>
+              <a:t>DP</a:t>
+            </a:r>
+          </a:p>
+        </p:txBody>
+      </p:sp>
+      <p:sp>
+        <p:nvSpPr>
+          <p:cNvPr id="13" name="TextBox 12">
+            <a:extLst>
+              <a:ext uri="{FF2B5EF4-FFF2-40B4-BE49-F238E27FC236}">
+                <a16:creationId xmlns:a16="http://schemas.microsoft.com/office/drawing/2014/main" id="{74AE447B-24FF-4238-8929-64080AC452E0}"/>
+              </a:ext>
+            </a:extLst>
+          </p:cNvPr>
+          <p:cNvSpPr txBox="1"/>
+          <p:nvPr/>
+        </p:nvSpPr>
+        <p:spPr>
+          <a:xfrm>
+            <a:off x="1243250" y="2240723"/>
+            <a:ext cx="445956" cy="369332"/>
+          </a:xfrm>
+          <a:prstGeom prst="rect">
+            <a:avLst/>
+          </a:prstGeom>
+          <a:noFill/>
+        </p:spPr>
+        <p:txBody>
+          <a:bodyPr wrap="none" rtlCol="0">
+            <a:spAutoFit/>
+          </a:bodyPr>
+          <a:lstStyle/>
+          <a:p>
+            <a:r>
+              <a:rPr lang="en-US" dirty="0"/>
+              <a:t>DP</a:t>
+            </a:r>
+          </a:p>
+        </p:txBody>
+      </p:sp>
+      <p:sp>
+        <p:nvSpPr>
+          <p:cNvPr id="14" name="TextBox 13">
+            <a:extLst>
+              <a:ext uri="{FF2B5EF4-FFF2-40B4-BE49-F238E27FC236}">
+                <a16:creationId xmlns:a16="http://schemas.microsoft.com/office/drawing/2014/main" id="{677AF13E-2501-484C-9FA3-D8B20D32A4A2}"/>
+              </a:ext>
+            </a:extLst>
+          </p:cNvPr>
+          <p:cNvSpPr txBox="1"/>
+          <p:nvPr/>
+        </p:nvSpPr>
+        <p:spPr>
+          <a:xfrm>
+            <a:off x="2032144" y="1734529"/>
+            <a:ext cx="445956" cy="369332"/>
+          </a:xfrm>
+          <a:prstGeom prst="rect">
+            <a:avLst/>
+          </a:prstGeom>
+          <a:noFill/>
+        </p:spPr>
+        <p:txBody>
+          <a:bodyPr wrap="none" rtlCol="0">
+            <a:spAutoFit/>
+          </a:bodyPr>
+          <a:lstStyle/>
+          <a:p>
+            <a:r>
+              <a:rPr lang="en-US" dirty="0"/>
+              <a:t>DP</a:t>
+            </a:r>
+          </a:p>
+        </p:txBody>
+      </p:sp>
+      <p:sp>
+        <p:nvSpPr>
+          <p:cNvPr id="15" name="TextBox 14">
+            <a:extLst>
+              <a:ext uri="{FF2B5EF4-FFF2-40B4-BE49-F238E27FC236}">
+                <a16:creationId xmlns:a16="http://schemas.microsoft.com/office/drawing/2014/main" id="{2A170CC0-FD20-4B04-8E56-B6FCD3018D5C}"/>
+              </a:ext>
+            </a:extLst>
+          </p:cNvPr>
+          <p:cNvSpPr txBox="1"/>
+          <p:nvPr/>
+        </p:nvSpPr>
+        <p:spPr>
+          <a:xfrm>
+            <a:off x="2032144" y="2233084"/>
+            <a:ext cx="445956" cy="369332"/>
+          </a:xfrm>
+          <a:prstGeom prst="rect">
+            <a:avLst/>
+          </a:prstGeom>
+          <a:noFill/>
+        </p:spPr>
+        <p:txBody>
+          <a:bodyPr wrap="none" rtlCol="0">
+            <a:spAutoFit/>
+          </a:bodyPr>
+          <a:lstStyle/>
+          <a:p>
+            <a:r>
+              <a:rPr lang="en-US" dirty="0"/>
+              <a:t>DP</a:t>
+            </a:r>
+          </a:p>
+        </p:txBody>
+      </p:sp>
+      <p:sp>
+        <p:nvSpPr>
+          <p:cNvPr id="16" name="TextBox 15">
+            <a:extLst>
+              <a:ext uri="{FF2B5EF4-FFF2-40B4-BE49-F238E27FC236}">
+                <a16:creationId xmlns:a16="http://schemas.microsoft.com/office/drawing/2014/main" id="{AF4574C7-35F1-4C6A-A5F9-0EE1F98D5A88}"/>
+              </a:ext>
+            </a:extLst>
+          </p:cNvPr>
+          <p:cNvSpPr txBox="1"/>
+          <p:nvPr/>
+        </p:nvSpPr>
+        <p:spPr>
+          <a:xfrm>
+            <a:off x="2821038" y="1742168"/>
+            <a:ext cx="445956" cy="369332"/>
+          </a:xfrm>
+          <a:prstGeom prst="rect">
+            <a:avLst/>
+          </a:prstGeom>
+          <a:noFill/>
+        </p:spPr>
+        <p:txBody>
+          <a:bodyPr wrap="none" rtlCol="0">
+            <a:spAutoFit/>
+          </a:bodyPr>
+          <a:lstStyle/>
+          <a:p>
+            <a:r>
+              <a:rPr lang="en-US" dirty="0"/>
+              <a:t>DP</a:t>
+            </a:r>
+          </a:p>
+        </p:txBody>
+      </p:sp>
+      <p:sp>
+        <p:nvSpPr>
+          <p:cNvPr id="17" name="TextBox 16">
+            <a:extLst>
+              <a:ext uri="{FF2B5EF4-FFF2-40B4-BE49-F238E27FC236}">
+                <a16:creationId xmlns:a16="http://schemas.microsoft.com/office/drawing/2014/main" id="{50A9BCAC-460D-41C8-B156-73AA680D5584}"/>
+              </a:ext>
+            </a:extLst>
+          </p:cNvPr>
+          <p:cNvSpPr txBox="1"/>
+          <p:nvPr/>
+        </p:nvSpPr>
+        <p:spPr>
+          <a:xfrm>
+            <a:off x="2821038" y="2240723"/>
+            <a:ext cx="445956" cy="369332"/>
+          </a:xfrm>
+          <a:prstGeom prst="rect">
+            <a:avLst/>
+          </a:prstGeom>
+          <a:noFill/>
+        </p:spPr>
+        <p:txBody>
+          <a:bodyPr wrap="none" rtlCol="0">
+            <a:spAutoFit/>
+          </a:bodyPr>
+          <a:lstStyle/>
+          <a:p>
+            <a:r>
+              <a:rPr lang="en-US" dirty="0"/>
+              <a:t>DP</a:t>
+            </a:r>
+          </a:p>
+        </p:txBody>
+      </p:sp>
+      <p:sp>
+        <p:nvSpPr>
+          <p:cNvPr id="18" name="TextBox 17">
+            <a:extLst>
+              <a:ext uri="{FF2B5EF4-FFF2-40B4-BE49-F238E27FC236}">
+                <a16:creationId xmlns:a16="http://schemas.microsoft.com/office/drawing/2014/main" id="{90607DCE-C6B2-48F2-802D-87A89A7B42F3}"/>
+              </a:ext>
+            </a:extLst>
+          </p:cNvPr>
+          <p:cNvSpPr txBox="1"/>
+          <p:nvPr/>
+        </p:nvSpPr>
+        <p:spPr>
+          <a:xfrm>
+            <a:off x="3609932" y="1734529"/>
+            <a:ext cx="445956" cy="369332"/>
+          </a:xfrm>
+          <a:prstGeom prst="rect">
+            <a:avLst/>
+          </a:prstGeom>
+          <a:noFill/>
+        </p:spPr>
+        <p:txBody>
+          <a:bodyPr wrap="none" rtlCol="0">
+            <a:spAutoFit/>
+          </a:bodyPr>
+          <a:lstStyle/>
+          <a:p>
+            <a:r>
+              <a:rPr lang="en-US" dirty="0"/>
+              <a:t>DP</a:t>
+            </a:r>
+          </a:p>
+        </p:txBody>
+      </p:sp>
+      <p:sp>
+        <p:nvSpPr>
+          <p:cNvPr id="19" name="TextBox 18">
+            <a:extLst>
+              <a:ext uri="{FF2B5EF4-FFF2-40B4-BE49-F238E27FC236}">
+                <a16:creationId xmlns:a16="http://schemas.microsoft.com/office/drawing/2014/main" id="{07B708CC-49D0-43FC-961E-13BA2AEFBC54}"/>
+              </a:ext>
+            </a:extLst>
+          </p:cNvPr>
+          <p:cNvSpPr txBox="1"/>
+          <p:nvPr/>
+        </p:nvSpPr>
+        <p:spPr>
+          <a:xfrm>
+            <a:off x="3609932" y="2233084"/>
+            <a:ext cx="445956" cy="369332"/>
+          </a:xfrm>
+          <a:prstGeom prst="rect">
+            <a:avLst/>
+          </a:prstGeom>
+          <a:noFill/>
+        </p:spPr>
+        <p:txBody>
+          <a:bodyPr wrap="none" rtlCol="0">
+            <a:spAutoFit/>
+          </a:bodyPr>
+          <a:lstStyle/>
+          <a:p>
+            <a:r>
+              <a:rPr lang="en-US" dirty="0"/>
+              <a:t>DP</a:t>
+            </a:r>
+          </a:p>
+        </p:txBody>
+      </p:sp>
+      <p:sp>
+        <p:nvSpPr>
+          <p:cNvPr id="20" name="TextBox 19">
+            <a:extLst>
+              <a:ext uri="{FF2B5EF4-FFF2-40B4-BE49-F238E27FC236}">
+                <a16:creationId xmlns:a16="http://schemas.microsoft.com/office/drawing/2014/main" id="{20DF13F7-1F50-4C8E-8002-C68789F436E6}"/>
+              </a:ext>
+            </a:extLst>
+          </p:cNvPr>
+          <p:cNvSpPr txBox="1"/>
+          <p:nvPr/>
+        </p:nvSpPr>
+        <p:spPr>
+          <a:xfrm>
+            <a:off x="4398826" y="1734529"/>
+            <a:ext cx="445956" cy="369332"/>
+          </a:xfrm>
+          <a:prstGeom prst="rect">
+            <a:avLst/>
+          </a:prstGeom>
+          <a:noFill/>
+        </p:spPr>
+        <p:txBody>
+          <a:bodyPr wrap="none" rtlCol="0">
+            <a:spAutoFit/>
+          </a:bodyPr>
+          <a:lstStyle/>
+          <a:p>
+            <a:r>
+              <a:rPr lang="en-US" dirty="0"/>
+              <a:t>DP</a:t>
+            </a:r>
+          </a:p>
+        </p:txBody>
+      </p:sp>
+      <p:sp>
+        <p:nvSpPr>
+          <p:cNvPr id="21" name="TextBox 20">
+            <a:extLst>
+              <a:ext uri="{FF2B5EF4-FFF2-40B4-BE49-F238E27FC236}">
+                <a16:creationId xmlns:a16="http://schemas.microsoft.com/office/drawing/2014/main" id="{54F79A1B-37CA-4501-AFEB-F611D34B9FCE}"/>
+              </a:ext>
+            </a:extLst>
+          </p:cNvPr>
+          <p:cNvSpPr txBox="1"/>
+          <p:nvPr/>
+        </p:nvSpPr>
+        <p:spPr>
+          <a:xfrm>
+            <a:off x="4398826" y="2233084"/>
+            <a:ext cx="445956" cy="369332"/>
+          </a:xfrm>
+          <a:prstGeom prst="rect">
+            <a:avLst/>
+          </a:prstGeom>
+          <a:noFill/>
+        </p:spPr>
+        <p:txBody>
+          <a:bodyPr wrap="none" rtlCol="0">
+            <a:spAutoFit/>
+          </a:bodyPr>
+          <a:lstStyle/>
+          <a:p>
+            <a:r>
+              <a:rPr lang="en-US" dirty="0"/>
+              <a:t>DP</a:t>
+            </a:r>
+          </a:p>
+        </p:txBody>
+      </p:sp>
+      <p:sp>
+        <p:nvSpPr>
+          <p:cNvPr id="22" name="TextBox 21">
+            <a:extLst>
+              <a:ext uri="{FF2B5EF4-FFF2-40B4-BE49-F238E27FC236}">
+                <a16:creationId xmlns:a16="http://schemas.microsoft.com/office/drawing/2014/main" id="{ECECC4AE-0EA8-453E-BA95-DD2DF7B5DED9}"/>
+              </a:ext>
+            </a:extLst>
+          </p:cNvPr>
+          <p:cNvSpPr txBox="1"/>
+          <p:nvPr/>
+        </p:nvSpPr>
+        <p:spPr>
+          <a:xfrm>
+            <a:off x="5187720" y="1742168"/>
+            <a:ext cx="445956" cy="369332"/>
+          </a:xfrm>
+          <a:prstGeom prst="rect">
+            <a:avLst/>
+          </a:prstGeom>
+          <a:noFill/>
+        </p:spPr>
+        <p:txBody>
+          <a:bodyPr wrap="none" rtlCol="0">
+            <a:spAutoFit/>
+          </a:bodyPr>
+          <a:lstStyle/>
+          <a:p>
+            <a:r>
+              <a:rPr lang="en-US" dirty="0"/>
+              <a:t>DP</a:t>
+            </a:r>
+          </a:p>
+        </p:txBody>
+      </p:sp>
+      <p:sp>
+        <p:nvSpPr>
+          <p:cNvPr id="23" name="TextBox 22">
+            <a:extLst>
+              <a:ext uri="{FF2B5EF4-FFF2-40B4-BE49-F238E27FC236}">
+                <a16:creationId xmlns:a16="http://schemas.microsoft.com/office/drawing/2014/main" id="{55E8DA3E-B081-4911-9C31-BC6FA048C135}"/>
+              </a:ext>
+            </a:extLst>
+          </p:cNvPr>
+          <p:cNvSpPr txBox="1"/>
+          <p:nvPr/>
+        </p:nvSpPr>
+        <p:spPr>
+          <a:xfrm>
+            <a:off x="5187720" y="2240723"/>
+            <a:ext cx="445956" cy="369332"/>
+          </a:xfrm>
+          <a:prstGeom prst="rect">
+            <a:avLst/>
+          </a:prstGeom>
+          <a:noFill/>
+        </p:spPr>
+        <p:txBody>
+          <a:bodyPr wrap="none" rtlCol="0">
+            <a:spAutoFit/>
+          </a:bodyPr>
+          <a:lstStyle/>
+          <a:p>
+            <a:r>
+              <a:rPr lang="en-US" dirty="0"/>
+              <a:t>DP</a:t>
+            </a:r>
+          </a:p>
+        </p:txBody>
+      </p:sp>
+      <p:sp>
+        <p:nvSpPr>
+          <p:cNvPr id="24" name="TextBox 23">
+            <a:extLst>
+              <a:ext uri="{FF2B5EF4-FFF2-40B4-BE49-F238E27FC236}">
+                <a16:creationId xmlns:a16="http://schemas.microsoft.com/office/drawing/2014/main" id="{14224505-7DD5-4FB5-862E-DCFAB8909F9F}"/>
+              </a:ext>
+            </a:extLst>
+          </p:cNvPr>
+          <p:cNvSpPr txBox="1"/>
+          <p:nvPr/>
+        </p:nvSpPr>
+        <p:spPr>
+          <a:xfrm>
+            <a:off x="6542530" y="1742168"/>
+            <a:ext cx="445956" cy="369332"/>
+          </a:xfrm>
+          <a:prstGeom prst="rect">
+            <a:avLst/>
+          </a:prstGeom>
+          <a:noFill/>
+        </p:spPr>
+        <p:txBody>
+          <a:bodyPr wrap="none" rtlCol="0">
+            <a:spAutoFit/>
+          </a:bodyPr>
+          <a:lstStyle/>
+          <a:p>
+            <a:r>
+              <a:rPr lang="en-US" dirty="0"/>
+              <a:t>DP</a:t>
+            </a:r>
+          </a:p>
+        </p:txBody>
+      </p:sp>
+      <p:sp>
+        <p:nvSpPr>
+          <p:cNvPr id="25" name="TextBox 24">
+            <a:extLst>
+              <a:ext uri="{FF2B5EF4-FFF2-40B4-BE49-F238E27FC236}">
+                <a16:creationId xmlns:a16="http://schemas.microsoft.com/office/drawing/2014/main" id="{0F4C4247-FAE5-447E-BC45-638613D57752}"/>
+              </a:ext>
+            </a:extLst>
+          </p:cNvPr>
+          <p:cNvSpPr txBox="1"/>
+          <p:nvPr/>
+        </p:nvSpPr>
+        <p:spPr>
+          <a:xfrm>
+            <a:off x="6542530" y="2240723"/>
+            <a:ext cx="445956" cy="369332"/>
+          </a:xfrm>
+          <a:prstGeom prst="rect">
+            <a:avLst/>
+          </a:prstGeom>
+          <a:noFill/>
+        </p:spPr>
+        <p:txBody>
+          <a:bodyPr wrap="none" rtlCol="0">
+            <a:spAutoFit/>
+          </a:bodyPr>
+          <a:lstStyle/>
+          <a:p>
+            <a:r>
+              <a:rPr lang="en-US" dirty="0"/>
+              <a:t>DP</a:t>
+            </a:r>
+          </a:p>
+        </p:txBody>
+      </p:sp>
+      <p:sp>
+        <p:nvSpPr>
+          <p:cNvPr id="26" name="TextBox 25">
+            <a:extLst>
+              <a:ext uri="{FF2B5EF4-FFF2-40B4-BE49-F238E27FC236}">
+                <a16:creationId xmlns:a16="http://schemas.microsoft.com/office/drawing/2014/main" id="{F9B90AFD-CE60-48BE-9CB1-88DC3242FE05}"/>
+              </a:ext>
+            </a:extLst>
+          </p:cNvPr>
+          <p:cNvSpPr txBox="1"/>
+          <p:nvPr/>
+        </p:nvSpPr>
+        <p:spPr>
+          <a:xfrm>
+            <a:off x="7323333" y="1734529"/>
+            <a:ext cx="445956" cy="369332"/>
+          </a:xfrm>
+          <a:prstGeom prst="rect">
+            <a:avLst/>
+          </a:prstGeom>
+          <a:noFill/>
+        </p:spPr>
+        <p:txBody>
+          <a:bodyPr wrap="none" rtlCol="0">
+            <a:spAutoFit/>
+          </a:bodyPr>
+          <a:lstStyle/>
+          <a:p>
+            <a:r>
+              <a:rPr lang="en-US" dirty="0"/>
+              <a:t>DP</a:t>
+            </a:r>
+          </a:p>
+        </p:txBody>
+      </p:sp>
+      <p:sp>
+        <p:nvSpPr>
+          <p:cNvPr id="27" name="TextBox 26">
+            <a:extLst>
+              <a:ext uri="{FF2B5EF4-FFF2-40B4-BE49-F238E27FC236}">
+                <a16:creationId xmlns:a16="http://schemas.microsoft.com/office/drawing/2014/main" id="{58EAF9D2-7B67-44FE-AD9E-18AA7335630A}"/>
+              </a:ext>
+            </a:extLst>
+          </p:cNvPr>
+          <p:cNvSpPr txBox="1"/>
+          <p:nvPr/>
+        </p:nvSpPr>
+        <p:spPr>
+          <a:xfrm>
+            <a:off x="7323333" y="2233084"/>
+            <a:ext cx="445956" cy="369332"/>
+          </a:xfrm>
+          <a:prstGeom prst="rect">
+            <a:avLst/>
+          </a:prstGeom>
+          <a:noFill/>
+        </p:spPr>
+        <p:txBody>
+          <a:bodyPr wrap="none" rtlCol="0">
+            <a:spAutoFit/>
+          </a:bodyPr>
+          <a:lstStyle/>
+          <a:p>
+            <a:r>
+              <a:rPr lang="en-US" dirty="0"/>
+              <a:t>DP</a:t>
+            </a:r>
+          </a:p>
+        </p:txBody>
+      </p:sp>
+      <p:sp>
+        <p:nvSpPr>
+          <p:cNvPr id="28" name="TextBox 27">
+            <a:extLst>
+              <a:ext uri="{FF2B5EF4-FFF2-40B4-BE49-F238E27FC236}">
+                <a16:creationId xmlns:a16="http://schemas.microsoft.com/office/drawing/2014/main" id="{83FC9C77-3B44-4BAF-B280-EC5D2E08A10D}"/>
+              </a:ext>
+            </a:extLst>
+          </p:cNvPr>
+          <p:cNvSpPr txBox="1"/>
+          <p:nvPr/>
+        </p:nvSpPr>
+        <p:spPr>
+          <a:xfrm>
+            <a:off x="8136114" y="1734529"/>
+            <a:ext cx="445956" cy="369332"/>
+          </a:xfrm>
+          <a:prstGeom prst="rect">
+            <a:avLst/>
+          </a:prstGeom>
+          <a:noFill/>
+        </p:spPr>
+        <p:txBody>
+          <a:bodyPr wrap="none" rtlCol="0">
+            <a:spAutoFit/>
+          </a:bodyPr>
+          <a:lstStyle/>
+          <a:p>
+            <a:r>
+              <a:rPr lang="en-US" dirty="0"/>
+              <a:t>DP</a:t>
+            </a:r>
+          </a:p>
+        </p:txBody>
+      </p:sp>
+      <p:sp>
+        <p:nvSpPr>
+          <p:cNvPr id="29" name="TextBox 28">
+            <a:extLst>
+              <a:ext uri="{FF2B5EF4-FFF2-40B4-BE49-F238E27FC236}">
+                <a16:creationId xmlns:a16="http://schemas.microsoft.com/office/drawing/2014/main" id="{5005B689-D33B-4FE2-B34D-B30BF1CA6450}"/>
+              </a:ext>
+            </a:extLst>
+          </p:cNvPr>
+          <p:cNvSpPr txBox="1"/>
+          <p:nvPr/>
+        </p:nvSpPr>
+        <p:spPr>
+          <a:xfrm>
+            <a:off x="8136114" y="2233084"/>
+            <a:ext cx="445956" cy="369332"/>
+          </a:xfrm>
+          <a:prstGeom prst="rect">
+            <a:avLst/>
+          </a:prstGeom>
+          <a:noFill/>
+        </p:spPr>
+        <p:txBody>
+          <a:bodyPr wrap="none" rtlCol="0">
+            <a:spAutoFit/>
+          </a:bodyPr>
+          <a:lstStyle/>
+          <a:p>
+            <a:r>
+              <a:rPr lang="en-US" dirty="0"/>
+              <a:t>DP</a:t>
+            </a:r>
+          </a:p>
+        </p:txBody>
+      </p:sp>
+      <p:sp>
+        <p:nvSpPr>
+          <p:cNvPr id="30" name="TextBox 29">
+            <a:extLst>
+              <a:ext uri="{FF2B5EF4-FFF2-40B4-BE49-F238E27FC236}">
+                <a16:creationId xmlns:a16="http://schemas.microsoft.com/office/drawing/2014/main" id="{F8ADDCBB-4266-42A9-BA96-51DACB92A312}"/>
+              </a:ext>
+            </a:extLst>
+          </p:cNvPr>
+          <p:cNvSpPr txBox="1"/>
+          <p:nvPr/>
+        </p:nvSpPr>
+        <p:spPr>
+          <a:xfrm>
+            <a:off x="8927976" y="1734529"/>
+            <a:ext cx="445956" cy="369332"/>
+          </a:xfrm>
+          <a:prstGeom prst="rect">
+            <a:avLst/>
+          </a:prstGeom>
+          <a:noFill/>
+        </p:spPr>
+        <p:txBody>
+          <a:bodyPr wrap="none" rtlCol="0">
+            <a:spAutoFit/>
+          </a:bodyPr>
+          <a:lstStyle/>
+          <a:p>
+            <a:r>
+              <a:rPr lang="en-US" dirty="0"/>
+              <a:t>DP</a:t>
+            </a:r>
+          </a:p>
+        </p:txBody>
+      </p:sp>
+      <p:sp>
+        <p:nvSpPr>
+          <p:cNvPr id="31" name="TextBox 30">
+            <a:extLst>
+              <a:ext uri="{FF2B5EF4-FFF2-40B4-BE49-F238E27FC236}">
+                <a16:creationId xmlns:a16="http://schemas.microsoft.com/office/drawing/2014/main" id="{D23EEC7E-5E18-4E10-BEFF-E2B97BCD51CB}"/>
+              </a:ext>
+            </a:extLst>
+          </p:cNvPr>
+          <p:cNvSpPr txBox="1"/>
+          <p:nvPr/>
+        </p:nvSpPr>
+        <p:spPr>
+          <a:xfrm>
+            <a:off x="8927976" y="2233084"/>
+            <a:ext cx="445956" cy="369332"/>
+          </a:xfrm>
+          <a:prstGeom prst="rect">
+            <a:avLst/>
+          </a:prstGeom>
+          <a:noFill/>
+        </p:spPr>
+        <p:txBody>
+          <a:bodyPr wrap="none" rtlCol="0">
+            <a:spAutoFit/>
+          </a:bodyPr>
+          <a:lstStyle/>
+          <a:p>
+            <a:r>
+              <a:rPr lang="en-US" dirty="0"/>
+              <a:t>DP</a:t>
+            </a:r>
+          </a:p>
+        </p:txBody>
+      </p:sp>
+      <p:sp>
+        <p:nvSpPr>
+          <p:cNvPr id="32" name="TextBox 31">
+            <a:extLst>
+              <a:ext uri="{FF2B5EF4-FFF2-40B4-BE49-F238E27FC236}">
+                <a16:creationId xmlns:a16="http://schemas.microsoft.com/office/drawing/2014/main" id="{40988648-C6EA-4901-8632-92B3779842A6}"/>
+              </a:ext>
+            </a:extLst>
+          </p:cNvPr>
+          <p:cNvSpPr txBox="1"/>
+          <p:nvPr/>
+        </p:nvSpPr>
+        <p:spPr>
+          <a:xfrm>
+            <a:off x="9724952" y="1742168"/>
+            <a:ext cx="445956" cy="369332"/>
+          </a:xfrm>
+          <a:prstGeom prst="rect">
+            <a:avLst/>
+          </a:prstGeom>
+          <a:noFill/>
+        </p:spPr>
+        <p:txBody>
+          <a:bodyPr wrap="none" rtlCol="0">
+            <a:spAutoFit/>
+          </a:bodyPr>
+          <a:lstStyle/>
+          <a:p>
+            <a:r>
+              <a:rPr lang="en-US" dirty="0"/>
+              <a:t>DP</a:t>
+            </a:r>
+          </a:p>
+        </p:txBody>
+      </p:sp>
+      <p:sp>
+        <p:nvSpPr>
+          <p:cNvPr id="33" name="TextBox 32">
+            <a:extLst>
+              <a:ext uri="{FF2B5EF4-FFF2-40B4-BE49-F238E27FC236}">
+                <a16:creationId xmlns:a16="http://schemas.microsoft.com/office/drawing/2014/main" id="{FC7719FA-F87C-4070-BCF4-CC8E75591837}"/>
+              </a:ext>
+            </a:extLst>
+          </p:cNvPr>
+          <p:cNvSpPr txBox="1"/>
+          <p:nvPr/>
+        </p:nvSpPr>
+        <p:spPr>
+          <a:xfrm>
+            <a:off x="9724952" y="2240723"/>
+            <a:ext cx="445956" cy="369332"/>
+          </a:xfrm>
+          <a:prstGeom prst="rect">
+            <a:avLst/>
+          </a:prstGeom>
+          <a:noFill/>
+        </p:spPr>
+        <p:txBody>
+          <a:bodyPr wrap="none" rtlCol="0">
+            <a:spAutoFit/>
+          </a:bodyPr>
+          <a:lstStyle/>
+          <a:p>
+            <a:r>
+              <a:rPr lang="en-US" dirty="0"/>
+              <a:t>DP</a:t>
+            </a:r>
+          </a:p>
+        </p:txBody>
+      </p:sp>
+      <p:sp>
+        <p:nvSpPr>
+          <p:cNvPr id="34" name="TextBox 33">
+            <a:extLst>
+              <a:ext uri="{FF2B5EF4-FFF2-40B4-BE49-F238E27FC236}">
+                <a16:creationId xmlns:a16="http://schemas.microsoft.com/office/drawing/2014/main" id="{DFF20746-5F3B-405C-920E-37872AA57DA2}"/>
+              </a:ext>
+            </a:extLst>
+          </p:cNvPr>
+          <p:cNvSpPr txBox="1"/>
+          <p:nvPr/>
+        </p:nvSpPr>
+        <p:spPr>
+          <a:xfrm>
+            <a:off x="10516814" y="1742168"/>
+            <a:ext cx="445956" cy="369332"/>
+          </a:xfrm>
+          <a:prstGeom prst="rect">
+            <a:avLst/>
+          </a:prstGeom>
+          <a:noFill/>
+        </p:spPr>
+        <p:txBody>
+          <a:bodyPr wrap="none" rtlCol="0">
+            <a:spAutoFit/>
+          </a:bodyPr>
+          <a:lstStyle/>
+          <a:p>
+            <a:r>
+              <a:rPr lang="en-US" dirty="0"/>
+              <a:t>DP</a:t>
+            </a:r>
+          </a:p>
+        </p:txBody>
+      </p:sp>
+      <p:sp>
+        <p:nvSpPr>
+          <p:cNvPr id="35" name="TextBox 34">
+            <a:extLst>
+              <a:ext uri="{FF2B5EF4-FFF2-40B4-BE49-F238E27FC236}">
+                <a16:creationId xmlns:a16="http://schemas.microsoft.com/office/drawing/2014/main" id="{EF60B1F4-CC08-4852-B6BD-59E019BD9CC4}"/>
+              </a:ext>
+            </a:extLst>
+          </p:cNvPr>
+          <p:cNvSpPr txBox="1"/>
+          <p:nvPr/>
+        </p:nvSpPr>
+        <p:spPr>
+          <a:xfrm>
+            <a:off x="10516814" y="2240723"/>
+            <a:ext cx="445956" cy="369332"/>
+          </a:xfrm>
+          <a:prstGeom prst="rect">
+            <a:avLst/>
+          </a:prstGeom>
+          <a:noFill/>
+        </p:spPr>
+        <p:txBody>
+          <a:bodyPr wrap="none" rtlCol="0">
+            <a:spAutoFit/>
+          </a:bodyPr>
+          <a:lstStyle/>
+          <a:p>
+            <a:r>
+              <a:rPr lang="en-US" dirty="0"/>
+              <a:t>DP</a:t>
+            </a:r>
+          </a:p>
+        </p:txBody>
+      </p:sp>
+      <p:sp>
+        <p:nvSpPr>
+          <p:cNvPr id="36" name="TextBox 35">
+            <a:extLst>
+              <a:ext uri="{FF2B5EF4-FFF2-40B4-BE49-F238E27FC236}">
+                <a16:creationId xmlns:a16="http://schemas.microsoft.com/office/drawing/2014/main" id="{A6D88593-F6E6-4392-AD23-98ABE19AF662}"/>
+              </a:ext>
+            </a:extLst>
+          </p:cNvPr>
+          <p:cNvSpPr txBox="1"/>
+          <p:nvPr/>
+        </p:nvSpPr>
+        <p:spPr>
+          <a:xfrm>
+            <a:off x="2699955" y="937384"/>
+            <a:ext cx="1529585" cy="184666"/>
+          </a:xfrm>
+          <a:prstGeom prst="rect">
+            <a:avLst/>
+          </a:prstGeom>
+          <a:noFill/>
+        </p:spPr>
+        <p:txBody>
+          <a:bodyPr wrap="none" rtlCol="0">
+            <a:spAutoFit/>
+          </a:bodyPr>
+          <a:lstStyle/>
+          <a:p>
+            <a:pPr algn="ctr"/>
+            <a:r>
+              <a:rPr lang="en-US" sz="600" b="1" i="0" dirty="0">
+                <a:solidFill>
+                  <a:srgbClr val="222222"/>
+                </a:solidFill>
+                <a:effectLst/>
+                <a:latin typeface="Arial" panose="020B0604020202020204" pitchFamily="34" charset="0"/>
+              </a:rPr>
+              <a:t>ERF8-050-01-L-D-EM2-TR  connector</a:t>
+            </a:r>
+            <a:endParaRPr lang="en-US" sz="600" b="1" dirty="0"/>
+          </a:p>
+        </p:txBody>
+      </p:sp>
+      <p:sp>
+        <p:nvSpPr>
+          <p:cNvPr id="37" name="TextBox 36">
+            <a:extLst>
+              <a:ext uri="{FF2B5EF4-FFF2-40B4-BE49-F238E27FC236}">
+                <a16:creationId xmlns:a16="http://schemas.microsoft.com/office/drawing/2014/main" id="{A6A65D26-1F48-4050-A18B-260829D45EE8}"/>
+              </a:ext>
+            </a:extLst>
+          </p:cNvPr>
+          <p:cNvSpPr txBox="1"/>
+          <p:nvPr/>
+        </p:nvSpPr>
+        <p:spPr>
+          <a:xfrm>
+            <a:off x="7990609" y="939545"/>
+            <a:ext cx="1529585" cy="184666"/>
+          </a:xfrm>
+          <a:prstGeom prst="rect">
+            <a:avLst/>
+          </a:prstGeom>
+          <a:noFill/>
+        </p:spPr>
+        <p:txBody>
+          <a:bodyPr wrap="none" rtlCol="0">
+            <a:spAutoFit/>
+          </a:bodyPr>
+          <a:lstStyle/>
+          <a:p>
+            <a:pPr algn="ctr"/>
+            <a:r>
+              <a:rPr lang="en-US" sz="600" b="1" i="0" dirty="0">
+                <a:solidFill>
+                  <a:srgbClr val="222222"/>
+                </a:solidFill>
+                <a:effectLst/>
+                <a:latin typeface="Arial" panose="020B0604020202020204" pitchFamily="34" charset="0"/>
+              </a:rPr>
+              <a:t>ERF8-050-01-L-D-EM2-TR  connector</a:t>
+            </a:r>
+            <a:endParaRPr lang="en-US" sz="600" b="1" dirty="0"/>
+          </a:p>
+        </p:txBody>
+      </p:sp>
+      <p:sp>
+        <p:nvSpPr>
+          <p:cNvPr id="38" name="TextBox 37">
+            <a:extLst>
+              <a:ext uri="{FF2B5EF4-FFF2-40B4-BE49-F238E27FC236}">
+                <a16:creationId xmlns:a16="http://schemas.microsoft.com/office/drawing/2014/main" id="{FAB688A6-102A-4A64-9750-DB6C56B9D8AF}"/>
+              </a:ext>
+            </a:extLst>
+          </p:cNvPr>
+          <p:cNvSpPr txBox="1"/>
+          <p:nvPr/>
+        </p:nvSpPr>
+        <p:spPr>
+          <a:xfrm>
+            <a:off x="2671806" y="3244334"/>
+            <a:ext cx="1529585" cy="184666"/>
+          </a:xfrm>
+          <a:prstGeom prst="rect">
+            <a:avLst/>
+          </a:prstGeom>
+          <a:noFill/>
+        </p:spPr>
+        <p:txBody>
+          <a:bodyPr wrap="none" rtlCol="0">
+            <a:spAutoFit/>
+          </a:bodyPr>
+          <a:lstStyle/>
+          <a:p>
+            <a:pPr algn="ctr"/>
+            <a:r>
+              <a:rPr lang="en-US" sz="600" b="1" i="0" dirty="0">
+                <a:solidFill>
+                  <a:srgbClr val="222222"/>
+                </a:solidFill>
+                <a:effectLst/>
+                <a:latin typeface="Arial" panose="020B0604020202020204" pitchFamily="34" charset="0"/>
+              </a:rPr>
+              <a:t>ERF8-050-01-L-D-EM2-TR  connector</a:t>
+            </a:r>
+            <a:endParaRPr lang="en-US" sz="600" b="1" dirty="0"/>
+          </a:p>
+        </p:txBody>
+      </p:sp>
+      <p:sp>
+        <p:nvSpPr>
+          <p:cNvPr id="39" name="TextBox 38">
+            <a:extLst>
+              <a:ext uri="{FF2B5EF4-FFF2-40B4-BE49-F238E27FC236}">
+                <a16:creationId xmlns:a16="http://schemas.microsoft.com/office/drawing/2014/main" id="{F4A834BF-751F-4DA2-89A9-296188348627}"/>
+              </a:ext>
+            </a:extLst>
+          </p:cNvPr>
+          <p:cNvSpPr txBox="1"/>
+          <p:nvPr/>
+        </p:nvSpPr>
+        <p:spPr>
+          <a:xfrm>
+            <a:off x="7954748" y="3244334"/>
+            <a:ext cx="1529585" cy="184666"/>
+          </a:xfrm>
+          <a:prstGeom prst="rect">
+            <a:avLst/>
+          </a:prstGeom>
+          <a:noFill/>
+        </p:spPr>
+        <p:txBody>
+          <a:bodyPr wrap="none" rtlCol="0">
+            <a:spAutoFit/>
+          </a:bodyPr>
+          <a:lstStyle/>
+          <a:p>
+            <a:pPr algn="ctr"/>
+            <a:r>
+              <a:rPr lang="en-US" sz="600" b="1" i="0" dirty="0">
+                <a:solidFill>
+                  <a:srgbClr val="222222"/>
+                </a:solidFill>
+                <a:effectLst/>
+                <a:latin typeface="Arial" panose="020B0604020202020204" pitchFamily="34" charset="0"/>
+              </a:rPr>
+              <a:t>ERF8-050-01-L-D-EM2-TR  connector</a:t>
+            </a:r>
+            <a:endParaRPr lang="en-US" sz="600" b="1" dirty="0"/>
+          </a:p>
+        </p:txBody>
+      </p:sp>
+      <p:sp>
+        <p:nvSpPr>
+          <p:cNvPr id="40" name="TextBox 39">
+            <a:extLst>
+              <a:ext uri="{FF2B5EF4-FFF2-40B4-BE49-F238E27FC236}">
+                <a16:creationId xmlns:a16="http://schemas.microsoft.com/office/drawing/2014/main" id="{EEEB97F2-8B17-422E-A2FC-FE60A736A43D}"/>
+              </a:ext>
+            </a:extLst>
+          </p:cNvPr>
+          <p:cNvSpPr txBox="1"/>
+          <p:nvPr/>
+        </p:nvSpPr>
+        <p:spPr>
+          <a:xfrm>
+            <a:off x="2699955" y="4041479"/>
+            <a:ext cx="1529585" cy="184666"/>
+          </a:xfrm>
+          <a:prstGeom prst="rect">
+            <a:avLst/>
+          </a:prstGeom>
+          <a:noFill/>
+        </p:spPr>
+        <p:txBody>
+          <a:bodyPr wrap="none" rtlCol="0">
+            <a:spAutoFit/>
+          </a:bodyPr>
+          <a:lstStyle/>
+          <a:p>
+            <a:pPr algn="ctr"/>
+            <a:r>
+              <a:rPr lang="en-US" sz="600" b="1" i="0" dirty="0">
+                <a:solidFill>
+                  <a:srgbClr val="222222"/>
+                </a:solidFill>
+                <a:effectLst/>
+                <a:latin typeface="Arial" panose="020B0604020202020204" pitchFamily="34" charset="0"/>
+              </a:rPr>
+              <a:t>ERF8-050-01-L-D-EM2-TR  connector</a:t>
+            </a:r>
+            <a:endParaRPr lang="en-US" sz="600" b="1" dirty="0"/>
+          </a:p>
+        </p:txBody>
+      </p:sp>
+      <p:sp>
+        <p:nvSpPr>
+          <p:cNvPr id="41" name="TextBox 40">
+            <a:extLst>
+              <a:ext uri="{FF2B5EF4-FFF2-40B4-BE49-F238E27FC236}">
+                <a16:creationId xmlns:a16="http://schemas.microsoft.com/office/drawing/2014/main" id="{ABC17EEA-4046-4DE9-B229-9D8D74A44069}"/>
+              </a:ext>
+            </a:extLst>
+          </p:cNvPr>
+          <p:cNvSpPr txBox="1"/>
+          <p:nvPr/>
+        </p:nvSpPr>
+        <p:spPr>
+          <a:xfrm>
+            <a:off x="7990608" y="4039318"/>
+            <a:ext cx="1529585" cy="184666"/>
+          </a:xfrm>
+          <a:prstGeom prst="rect">
+            <a:avLst/>
+          </a:prstGeom>
+          <a:noFill/>
+        </p:spPr>
+        <p:txBody>
+          <a:bodyPr wrap="none" rtlCol="0">
+            <a:spAutoFit/>
+          </a:bodyPr>
+          <a:lstStyle/>
+          <a:p>
+            <a:pPr algn="ctr"/>
+            <a:r>
+              <a:rPr lang="en-US" sz="600" b="1" i="0" dirty="0">
+                <a:solidFill>
+                  <a:srgbClr val="222222"/>
+                </a:solidFill>
+                <a:effectLst/>
+                <a:latin typeface="Arial" panose="020B0604020202020204" pitchFamily="34" charset="0"/>
+              </a:rPr>
+              <a:t>ERF8-050-01-L-D-EM2-TR  connector</a:t>
+            </a:r>
+            <a:endParaRPr lang="en-US" sz="600" b="1" dirty="0"/>
+          </a:p>
+        </p:txBody>
+      </p:sp>
+      <p:sp>
+        <p:nvSpPr>
+          <p:cNvPr id="42" name="TextBox 41">
+            <a:extLst>
+              <a:ext uri="{FF2B5EF4-FFF2-40B4-BE49-F238E27FC236}">
+                <a16:creationId xmlns:a16="http://schemas.microsoft.com/office/drawing/2014/main" id="{14F04E3F-C14B-40F8-A520-7571AFA8E5A3}"/>
+              </a:ext>
+            </a:extLst>
+          </p:cNvPr>
+          <p:cNvSpPr txBox="1"/>
+          <p:nvPr/>
+        </p:nvSpPr>
+        <p:spPr>
+          <a:xfrm>
+            <a:off x="2699955" y="6301299"/>
+            <a:ext cx="1529585" cy="184666"/>
+          </a:xfrm>
+          <a:prstGeom prst="rect">
+            <a:avLst/>
+          </a:prstGeom>
+          <a:noFill/>
+        </p:spPr>
+        <p:txBody>
+          <a:bodyPr wrap="none" rtlCol="0">
+            <a:spAutoFit/>
+          </a:bodyPr>
+          <a:lstStyle/>
+          <a:p>
+            <a:pPr algn="ctr"/>
+            <a:r>
+              <a:rPr lang="en-US" sz="600" b="1" i="0" dirty="0">
+                <a:solidFill>
+                  <a:srgbClr val="222222"/>
+                </a:solidFill>
+                <a:effectLst/>
+                <a:latin typeface="Arial" panose="020B0604020202020204" pitchFamily="34" charset="0"/>
+              </a:rPr>
+              <a:t>ERF8-050-01-L-D-EM2-TR  connector</a:t>
+            </a:r>
+            <a:endParaRPr lang="en-US" sz="600" b="1" dirty="0"/>
+          </a:p>
+        </p:txBody>
+      </p:sp>
+      <p:sp>
+        <p:nvSpPr>
+          <p:cNvPr id="43" name="TextBox 42">
+            <a:extLst>
+              <a:ext uri="{FF2B5EF4-FFF2-40B4-BE49-F238E27FC236}">
+                <a16:creationId xmlns:a16="http://schemas.microsoft.com/office/drawing/2014/main" id="{CF0A99EE-068C-48D1-A07A-FB435005A64D}"/>
+              </a:ext>
+            </a:extLst>
+          </p:cNvPr>
+          <p:cNvSpPr txBox="1"/>
+          <p:nvPr/>
+        </p:nvSpPr>
+        <p:spPr>
+          <a:xfrm>
+            <a:off x="7990608" y="6301299"/>
+            <a:ext cx="1529585" cy="184666"/>
+          </a:xfrm>
+          <a:prstGeom prst="rect">
+            <a:avLst/>
+          </a:prstGeom>
+          <a:noFill/>
+        </p:spPr>
+        <p:txBody>
+          <a:bodyPr wrap="none" rtlCol="0">
+            <a:spAutoFit/>
+          </a:bodyPr>
+          <a:lstStyle/>
+          <a:p>
+            <a:pPr algn="ctr"/>
+            <a:r>
+              <a:rPr lang="en-US" sz="600" b="1" i="0" dirty="0">
+                <a:solidFill>
+                  <a:srgbClr val="222222"/>
+                </a:solidFill>
+                <a:effectLst/>
+                <a:latin typeface="Arial" panose="020B0604020202020204" pitchFamily="34" charset="0"/>
+              </a:rPr>
+              <a:t>ERF8-050-01-L-D-EM2-TR  connector</a:t>
+            </a:r>
+            <a:endParaRPr lang="en-US" sz="600" b="1" dirty="0"/>
+          </a:p>
+        </p:txBody>
+      </p:sp>
+    </p:spTree>
+    <p:extLst>
+      <p:ext uri="{BB962C8B-B14F-4D97-AF65-F5344CB8AC3E}">
+        <p14:creationId xmlns:p14="http://schemas.microsoft.com/office/powerpoint/2010/main" val="1088427201"/>
       </p:ext>
     </p:extLst>
   </p:cSld>

</xml_diff>

<commit_message>
Update PCB Panel production format
</commit_message>
<xml_diff>
--- a/Docs/Production Guide.pptx
+++ b/Docs/Production Guide.pptx
@@ -8,8 +8,6 @@
     <p:sldId id="258" r:id="rId2"/>
     <p:sldId id="261" r:id="rId3"/>
     <p:sldId id="259" r:id="rId4"/>
-    <p:sldId id="263" r:id="rId5"/>
-    <p:sldId id="262" r:id="rId6"/>
   </p:sldIdLst>
   <p:sldSz cx="12192000" cy="6858000"/>
   <p:notesSz cx="6858000" cy="9144000"/>
@@ -4581,1703 +4579,6 @@
 </p:sld>
 </file>
 
-<file path=ppt/slides/slide4.xml><?xml version="1.0" encoding="utf-8"?>
-<p:sld xmlns:a="http://schemas.openxmlformats.org/drawingml/2006/main" xmlns:r="http://schemas.openxmlformats.org/officeDocument/2006/relationships" xmlns:p="http://schemas.openxmlformats.org/presentationml/2006/main">
-  <p:cSld>
-    <p:spTree>
-      <p:nvGrpSpPr>
-        <p:cNvPr id="1" name=""/>
-        <p:cNvGrpSpPr/>
-        <p:nvPr/>
-      </p:nvGrpSpPr>
-      <p:grpSpPr>
-        <a:xfrm>
-          <a:off x="0" y="0"/>
-          <a:ext cx="0" cy="0"/>
-          <a:chOff x="0" y="0"/>
-          <a:chExt cx="0" cy="0"/>
-        </a:xfrm>
-      </p:grpSpPr>
-      <p:sp>
-        <p:nvSpPr>
-          <p:cNvPr id="8" name="Rectangle: Rounded Corners 7">
-            <a:extLst>
-              <a:ext uri="{FF2B5EF4-FFF2-40B4-BE49-F238E27FC236}">
-                <a16:creationId xmlns:a16="http://schemas.microsoft.com/office/drawing/2014/main" id="{7864F8F3-6999-461F-B47B-54216F5CE7E3}"/>
-              </a:ext>
-            </a:extLst>
-          </p:cNvPr>
-          <p:cNvSpPr/>
-          <p:nvPr/>
-        </p:nvSpPr>
-        <p:spPr>
-          <a:xfrm>
-            <a:off x="134471" y="627529"/>
-            <a:ext cx="11905129" cy="6104965"/>
-          </a:xfrm>
-          <a:prstGeom prst="roundRect">
-            <a:avLst>
-              <a:gd name="adj" fmla="val 8297"/>
-            </a:avLst>
-          </a:prstGeom>
-          <a:solidFill>
-            <a:srgbClr val="B3B3CD"/>
-          </a:solidFill>
-        </p:spPr>
-        <p:style>
-          <a:lnRef idx="2">
-            <a:schemeClr val="accent1">
-              <a:shade val="50000"/>
-            </a:schemeClr>
-          </a:lnRef>
-          <a:fillRef idx="1">
-            <a:schemeClr val="accent1"/>
-          </a:fillRef>
-          <a:effectRef idx="0">
-            <a:schemeClr val="accent1"/>
-          </a:effectRef>
-          <a:fontRef idx="minor">
-            <a:schemeClr val="lt1"/>
-          </a:fontRef>
-        </p:style>
-        <p:txBody>
-          <a:bodyPr rtlCol="0" anchor="ctr"/>
-          <a:lstStyle/>
-          <a:p>
-            <a:pPr algn="ctr"/>
-            <a:endParaRPr lang="en-US"/>
-          </a:p>
-        </p:txBody>
-      </p:sp>
-      <p:sp>
-        <p:nvSpPr>
-          <p:cNvPr id="2" name="Title 1">
-            <a:extLst>
-              <a:ext uri="{FF2B5EF4-FFF2-40B4-BE49-F238E27FC236}">
-                <a16:creationId xmlns:a16="http://schemas.microsoft.com/office/drawing/2014/main" id="{321759F6-9CB9-4ACF-B30F-2AAFED86D3E8}"/>
-              </a:ext>
-            </a:extLst>
-          </p:cNvPr>
-          <p:cNvSpPr>
-            <a:spLocks noGrp="1"/>
-          </p:cNvSpPr>
-          <p:nvPr>
-            <p:ph type="title"/>
-          </p:nvPr>
-        </p:nvSpPr>
-        <p:spPr>
-          <a:xfrm>
-            <a:off x="4509588" y="-40200"/>
-            <a:ext cx="3169025" cy="650069"/>
-          </a:xfrm>
-        </p:spPr>
-        <p:txBody>
-          <a:bodyPr>
-            <a:normAutofit fontScale="90000"/>
-          </a:bodyPr>
-          <a:lstStyle/>
-          <a:p>
-            <a:r>
-              <a:rPr lang="en-US" b="1" dirty="0"/>
-              <a:t>Panel design</a:t>
-            </a:r>
-          </a:p>
-        </p:txBody>
-      </p:sp>
-      <p:sp>
-        <p:nvSpPr>
-          <p:cNvPr id="10" name="TextBox 9">
-            <a:extLst>
-              <a:ext uri="{FF2B5EF4-FFF2-40B4-BE49-F238E27FC236}">
-                <a16:creationId xmlns:a16="http://schemas.microsoft.com/office/drawing/2014/main" id="{59CE69E2-CAB2-422C-A9C9-A541E7BA8141}"/>
-              </a:ext>
-            </a:extLst>
-          </p:cNvPr>
-          <p:cNvSpPr txBox="1"/>
-          <p:nvPr/>
-        </p:nvSpPr>
-        <p:spPr>
-          <a:xfrm>
-            <a:off x="5340259" y="3820668"/>
-            <a:ext cx="1482018" cy="369332"/>
-          </a:xfrm>
-          <a:prstGeom prst="rect">
-            <a:avLst/>
-          </a:prstGeom>
-          <a:noFill/>
-        </p:spPr>
-        <p:txBody>
-          <a:bodyPr wrap="square" rtlCol="0">
-            <a:spAutoFit/>
-          </a:bodyPr>
-          <a:lstStyle/>
-          <a:p>
-            <a:pPr algn="ctr"/>
-            <a:r>
-              <a:rPr lang="en-US" dirty="0">
-                <a:solidFill>
-                  <a:schemeClr val="bg1"/>
-                </a:solidFill>
-              </a:rPr>
-              <a:t>Bottom View</a:t>
-            </a:r>
-          </a:p>
-        </p:txBody>
-      </p:sp>
-      <p:sp>
-        <p:nvSpPr>
-          <p:cNvPr id="11" name="TextBox 10">
-            <a:extLst>
-              <a:ext uri="{FF2B5EF4-FFF2-40B4-BE49-F238E27FC236}">
-                <a16:creationId xmlns:a16="http://schemas.microsoft.com/office/drawing/2014/main" id="{C2185B35-F98C-4996-87E3-6163D6EAA496}"/>
-              </a:ext>
-            </a:extLst>
-          </p:cNvPr>
-          <p:cNvSpPr txBox="1"/>
-          <p:nvPr/>
-        </p:nvSpPr>
-        <p:spPr>
-          <a:xfrm>
-            <a:off x="5546474" y="718161"/>
-            <a:ext cx="1095255" cy="369332"/>
-          </a:xfrm>
-          <a:prstGeom prst="rect">
-            <a:avLst/>
-          </a:prstGeom>
-          <a:noFill/>
-        </p:spPr>
-        <p:txBody>
-          <a:bodyPr wrap="square" rtlCol="0">
-            <a:spAutoFit/>
-          </a:bodyPr>
-          <a:lstStyle/>
-          <a:p>
-            <a:pPr algn="ctr"/>
-            <a:r>
-              <a:rPr lang="en-US" dirty="0">
-                <a:solidFill>
-                  <a:schemeClr val="bg1"/>
-                </a:solidFill>
-              </a:rPr>
-              <a:t>Top View</a:t>
-            </a:r>
-          </a:p>
-        </p:txBody>
-      </p:sp>
-      <p:pic>
-        <p:nvPicPr>
-          <p:cNvPr id="12" name="Picture 11">
-            <a:extLst>
-              <a:ext uri="{FF2B5EF4-FFF2-40B4-BE49-F238E27FC236}">
-                <a16:creationId xmlns:a16="http://schemas.microsoft.com/office/drawing/2014/main" id="{5E341B01-DF53-4454-9888-5750CB66E890}"/>
-              </a:ext>
-            </a:extLst>
-          </p:cNvPr>
-          <p:cNvPicPr>
-            <a:picLocks noChangeAspect="1"/>
-          </p:cNvPicPr>
-          <p:nvPr/>
-        </p:nvPicPr>
-        <p:blipFill>
-          <a:blip r:embed="rId2"/>
-          <a:stretch>
-            <a:fillRect/>
-          </a:stretch>
-        </p:blipFill>
-        <p:spPr>
-          <a:xfrm>
-            <a:off x="592893" y="1122049"/>
-            <a:ext cx="11002419" cy="2120123"/>
-          </a:xfrm>
-          <a:prstGeom prst="rect">
-            <a:avLst/>
-          </a:prstGeom>
-        </p:spPr>
-      </p:pic>
-      <p:pic>
-        <p:nvPicPr>
-          <p:cNvPr id="13" name="Picture 12">
-            <a:extLst>
-              <a:ext uri="{FF2B5EF4-FFF2-40B4-BE49-F238E27FC236}">
-                <a16:creationId xmlns:a16="http://schemas.microsoft.com/office/drawing/2014/main" id="{41AF0A9E-0BF3-43DF-8817-2099608B3EFF}"/>
-              </a:ext>
-            </a:extLst>
-          </p:cNvPr>
-          <p:cNvPicPr>
-            <a:picLocks noChangeAspect="1"/>
-          </p:cNvPicPr>
-          <p:nvPr/>
-        </p:nvPicPr>
-        <p:blipFill>
-          <a:blip r:embed="rId3"/>
-          <a:stretch>
-            <a:fillRect/>
-          </a:stretch>
-        </p:blipFill>
-        <p:spPr>
-          <a:xfrm>
-            <a:off x="614363" y="4223984"/>
-            <a:ext cx="10980949" cy="2110142"/>
-          </a:xfrm>
-          <a:prstGeom prst="rect">
-            <a:avLst/>
-          </a:prstGeom>
-        </p:spPr>
-      </p:pic>
-    </p:spTree>
-    <p:extLst>
-      <p:ext uri="{BB962C8B-B14F-4D97-AF65-F5344CB8AC3E}">
-        <p14:creationId xmlns:p14="http://schemas.microsoft.com/office/powerpoint/2010/main" val="2991548143"/>
-      </p:ext>
-    </p:extLst>
-  </p:cSld>
-  <p:clrMapOvr>
-    <a:masterClrMapping/>
-  </p:clrMapOvr>
-</p:sld>
-</file>
-
-<file path=ppt/slides/slide5.xml><?xml version="1.0" encoding="utf-8"?>
-<p:sld xmlns:a="http://schemas.openxmlformats.org/drawingml/2006/main" xmlns:r="http://schemas.openxmlformats.org/officeDocument/2006/relationships" xmlns:p="http://schemas.openxmlformats.org/presentationml/2006/main">
-  <p:cSld>
-    <p:spTree>
-      <p:nvGrpSpPr>
-        <p:cNvPr id="1" name=""/>
-        <p:cNvGrpSpPr/>
-        <p:nvPr/>
-      </p:nvGrpSpPr>
-      <p:grpSpPr>
-        <a:xfrm>
-          <a:off x="0" y="0"/>
-          <a:ext cx="0" cy="0"/>
-          <a:chOff x="0" y="0"/>
-          <a:chExt cx="0" cy="0"/>
-        </a:xfrm>
-      </p:grpSpPr>
-      <p:sp>
-        <p:nvSpPr>
-          <p:cNvPr id="10" name="Rectangle: Rounded Corners 9">
-            <a:extLst>
-              <a:ext uri="{FF2B5EF4-FFF2-40B4-BE49-F238E27FC236}">
-                <a16:creationId xmlns:a16="http://schemas.microsoft.com/office/drawing/2014/main" id="{9BB5557E-938C-44A6-BFA8-8B3AD627732C}"/>
-              </a:ext>
-            </a:extLst>
-          </p:cNvPr>
-          <p:cNvSpPr/>
-          <p:nvPr/>
-        </p:nvSpPr>
-        <p:spPr>
-          <a:xfrm>
-            <a:off x="134471" y="627529"/>
-            <a:ext cx="11905129" cy="6104965"/>
-          </a:xfrm>
-          <a:prstGeom prst="roundRect">
-            <a:avLst>
-              <a:gd name="adj" fmla="val 8297"/>
-            </a:avLst>
-          </a:prstGeom>
-          <a:solidFill>
-            <a:srgbClr val="B3B3CD"/>
-          </a:solidFill>
-        </p:spPr>
-        <p:style>
-          <a:lnRef idx="2">
-            <a:schemeClr val="accent1">
-              <a:shade val="50000"/>
-            </a:schemeClr>
-          </a:lnRef>
-          <a:fillRef idx="1">
-            <a:schemeClr val="accent1"/>
-          </a:fillRef>
-          <a:effectRef idx="0">
-            <a:schemeClr val="accent1"/>
-          </a:effectRef>
-          <a:fontRef idx="minor">
-            <a:schemeClr val="lt1"/>
-          </a:fontRef>
-        </p:style>
-        <p:txBody>
-          <a:bodyPr rtlCol="0" anchor="ctr"/>
-          <a:lstStyle/>
-          <a:p>
-            <a:pPr algn="ctr"/>
-            <a:endParaRPr lang="en-US"/>
-          </a:p>
-        </p:txBody>
-      </p:sp>
-      <p:sp>
-        <p:nvSpPr>
-          <p:cNvPr id="2" name="Title 1">
-            <a:extLst>
-              <a:ext uri="{FF2B5EF4-FFF2-40B4-BE49-F238E27FC236}">
-                <a16:creationId xmlns:a16="http://schemas.microsoft.com/office/drawing/2014/main" id="{68817FB0-E017-4D60-AF88-A5CA004B036D}"/>
-              </a:ext>
-            </a:extLst>
-          </p:cNvPr>
-          <p:cNvSpPr>
-            <a:spLocks noGrp="1"/>
-          </p:cNvSpPr>
-          <p:nvPr>
-            <p:ph type="title"/>
-          </p:nvPr>
-        </p:nvSpPr>
-        <p:spPr>
-          <a:xfrm>
-            <a:off x="4201391" y="11805"/>
-            <a:ext cx="3789218" cy="493857"/>
-          </a:xfrm>
-        </p:spPr>
-        <p:txBody>
-          <a:bodyPr>
-            <a:normAutofit fontScale="90000"/>
-          </a:bodyPr>
-          <a:lstStyle/>
-          <a:p>
-            <a:pPr algn="ctr"/>
-            <a:r>
-              <a:rPr lang="en-US" b="1" dirty="0"/>
-              <a:t>Panel assembly</a:t>
-            </a:r>
-          </a:p>
-        </p:txBody>
-      </p:sp>
-      <p:pic>
-        <p:nvPicPr>
-          <p:cNvPr id="7" name="Picture 6">
-            <a:extLst>
-              <a:ext uri="{FF2B5EF4-FFF2-40B4-BE49-F238E27FC236}">
-                <a16:creationId xmlns:a16="http://schemas.microsoft.com/office/drawing/2014/main" id="{2DDF70F0-3271-44FA-9B72-AECD2FFC1A36}"/>
-              </a:ext>
-            </a:extLst>
-          </p:cNvPr>
-          <p:cNvPicPr>
-            <a:picLocks noChangeAspect="1"/>
-          </p:cNvPicPr>
-          <p:nvPr/>
-        </p:nvPicPr>
-        <p:blipFill>
-          <a:blip r:embed="rId2"/>
-          <a:stretch>
-            <a:fillRect/>
-          </a:stretch>
-        </p:blipFill>
-        <p:spPr>
-          <a:xfrm>
-            <a:off x="592893" y="871262"/>
-            <a:ext cx="11002419" cy="2599780"/>
-          </a:xfrm>
-          <a:prstGeom prst="rect">
-            <a:avLst/>
-          </a:prstGeom>
-        </p:spPr>
-      </p:pic>
-      <p:pic>
-        <p:nvPicPr>
-          <p:cNvPr id="9" name="Picture 8">
-            <a:extLst>
-              <a:ext uri="{FF2B5EF4-FFF2-40B4-BE49-F238E27FC236}">
-                <a16:creationId xmlns:a16="http://schemas.microsoft.com/office/drawing/2014/main" id="{7558AC86-4BD0-43E8-A746-AF2469944B33}"/>
-              </a:ext>
-            </a:extLst>
-          </p:cNvPr>
-          <p:cNvPicPr>
-            <a:picLocks noChangeAspect="1"/>
-          </p:cNvPicPr>
-          <p:nvPr/>
-        </p:nvPicPr>
-        <p:blipFill>
-          <a:blip r:embed="rId3"/>
-          <a:stretch>
-            <a:fillRect/>
-          </a:stretch>
-        </p:blipFill>
-        <p:spPr>
-          <a:xfrm>
-            <a:off x="565997" y="3964803"/>
-            <a:ext cx="11032546" cy="2606327"/>
-          </a:xfrm>
-          <a:prstGeom prst="rect">
-            <a:avLst/>
-          </a:prstGeom>
-        </p:spPr>
-      </p:pic>
-      <p:sp>
-        <p:nvSpPr>
-          <p:cNvPr id="11" name="TextBox 10">
-            <a:extLst>
-              <a:ext uri="{FF2B5EF4-FFF2-40B4-BE49-F238E27FC236}">
-                <a16:creationId xmlns:a16="http://schemas.microsoft.com/office/drawing/2014/main" id="{1F6D2839-0025-414E-A012-5D412087639A}"/>
-              </a:ext>
-            </a:extLst>
-          </p:cNvPr>
-          <p:cNvSpPr txBox="1"/>
-          <p:nvPr/>
-        </p:nvSpPr>
-        <p:spPr>
-          <a:xfrm>
-            <a:off x="5546474" y="718161"/>
-            <a:ext cx="1095255" cy="369332"/>
-          </a:xfrm>
-          <a:prstGeom prst="rect">
-            <a:avLst/>
-          </a:prstGeom>
-          <a:noFill/>
-        </p:spPr>
-        <p:txBody>
-          <a:bodyPr wrap="square" rtlCol="0">
-            <a:spAutoFit/>
-          </a:bodyPr>
-          <a:lstStyle/>
-          <a:p>
-            <a:pPr algn="ctr"/>
-            <a:r>
-              <a:rPr lang="en-US" dirty="0">
-                <a:solidFill>
-                  <a:schemeClr val="bg1"/>
-                </a:solidFill>
-              </a:rPr>
-              <a:t>Top View</a:t>
-            </a:r>
-          </a:p>
-        </p:txBody>
-      </p:sp>
-      <p:sp>
-        <p:nvSpPr>
-          <p:cNvPr id="12" name="TextBox 11">
-            <a:extLst>
-              <a:ext uri="{FF2B5EF4-FFF2-40B4-BE49-F238E27FC236}">
-                <a16:creationId xmlns:a16="http://schemas.microsoft.com/office/drawing/2014/main" id="{6D9421EB-E5B8-4845-8600-673A4D854A00}"/>
-              </a:ext>
-            </a:extLst>
-          </p:cNvPr>
-          <p:cNvSpPr txBox="1"/>
-          <p:nvPr/>
-        </p:nvSpPr>
-        <p:spPr>
-          <a:xfrm>
-            <a:off x="5340259" y="3820668"/>
-            <a:ext cx="1482018" cy="369332"/>
-          </a:xfrm>
-          <a:prstGeom prst="rect">
-            <a:avLst/>
-          </a:prstGeom>
-          <a:noFill/>
-        </p:spPr>
-        <p:txBody>
-          <a:bodyPr wrap="square" rtlCol="0">
-            <a:spAutoFit/>
-          </a:bodyPr>
-          <a:lstStyle/>
-          <a:p>
-            <a:pPr algn="ctr"/>
-            <a:r>
-              <a:rPr lang="en-US" dirty="0">
-                <a:solidFill>
-                  <a:schemeClr val="bg1"/>
-                </a:solidFill>
-              </a:rPr>
-              <a:t>Bottom View</a:t>
-            </a:r>
-          </a:p>
-        </p:txBody>
-      </p:sp>
-      <p:sp>
-        <p:nvSpPr>
-          <p:cNvPr id="8" name="TextBox 7">
-            <a:extLst>
-              <a:ext uri="{FF2B5EF4-FFF2-40B4-BE49-F238E27FC236}">
-                <a16:creationId xmlns:a16="http://schemas.microsoft.com/office/drawing/2014/main" id="{CC6C0C4B-8376-44A3-92AA-181DAD988254}"/>
-              </a:ext>
-            </a:extLst>
-          </p:cNvPr>
-          <p:cNvSpPr txBox="1"/>
-          <p:nvPr/>
-        </p:nvSpPr>
-        <p:spPr>
-          <a:xfrm>
-            <a:off x="1243250" y="1742168"/>
-            <a:ext cx="445956" cy="369332"/>
-          </a:xfrm>
-          <a:prstGeom prst="rect">
-            <a:avLst/>
-          </a:prstGeom>
-          <a:noFill/>
-        </p:spPr>
-        <p:txBody>
-          <a:bodyPr wrap="none" rtlCol="0">
-            <a:spAutoFit/>
-          </a:bodyPr>
-          <a:lstStyle/>
-          <a:p>
-            <a:r>
-              <a:rPr lang="en-US" dirty="0"/>
-              <a:t>DP</a:t>
-            </a:r>
-          </a:p>
-        </p:txBody>
-      </p:sp>
-      <p:sp>
-        <p:nvSpPr>
-          <p:cNvPr id="13" name="TextBox 12">
-            <a:extLst>
-              <a:ext uri="{FF2B5EF4-FFF2-40B4-BE49-F238E27FC236}">
-                <a16:creationId xmlns:a16="http://schemas.microsoft.com/office/drawing/2014/main" id="{74AE447B-24FF-4238-8929-64080AC452E0}"/>
-              </a:ext>
-            </a:extLst>
-          </p:cNvPr>
-          <p:cNvSpPr txBox="1"/>
-          <p:nvPr/>
-        </p:nvSpPr>
-        <p:spPr>
-          <a:xfrm>
-            <a:off x="1243250" y="2240723"/>
-            <a:ext cx="445956" cy="369332"/>
-          </a:xfrm>
-          <a:prstGeom prst="rect">
-            <a:avLst/>
-          </a:prstGeom>
-          <a:noFill/>
-        </p:spPr>
-        <p:txBody>
-          <a:bodyPr wrap="none" rtlCol="0">
-            <a:spAutoFit/>
-          </a:bodyPr>
-          <a:lstStyle/>
-          <a:p>
-            <a:r>
-              <a:rPr lang="en-US" dirty="0"/>
-              <a:t>DP</a:t>
-            </a:r>
-          </a:p>
-        </p:txBody>
-      </p:sp>
-      <p:sp>
-        <p:nvSpPr>
-          <p:cNvPr id="14" name="TextBox 13">
-            <a:extLst>
-              <a:ext uri="{FF2B5EF4-FFF2-40B4-BE49-F238E27FC236}">
-                <a16:creationId xmlns:a16="http://schemas.microsoft.com/office/drawing/2014/main" id="{677AF13E-2501-484C-9FA3-D8B20D32A4A2}"/>
-              </a:ext>
-            </a:extLst>
-          </p:cNvPr>
-          <p:cNvSpPr txBox="1"/>
-          <p:nvPr/>
-        </p:nvSpPr>
-        <p:spPr>
-          <a:xfrm>
-            <a:off x="2032144" y="1734529"/>
-            <a:ext cx="445956" cy="369332"/>
-          </a:xfrm>
-          <a:prstGeom prst="rect">
-            <a:avLst/>
-          </a:prstGeom>
-          <a:noFill/>
-        </p:spPr>
-        <p:txBody>
-          <a:bodyPr wrap="none" rtlCol="0">
-            <a:spAutoFit/>
-          </a:bodyPr>
-          <a:lstStyle/>
-          <a:p>
-            <a:r>
-              <a:rPr lang="en-US" dirty="0"/>
-              <a:t>DP</a:t>
-            </a:r>
-          </a:p>
-        </p:txBody>
-      </p:sp>
-      <p:sp>
-        <p:nvSpPr>
-          <p:cNvPr id="15" name="TextBox 14">
-            <a:extLst>
-              <a:ext uri="{FF2B5EF4-FFF2-40B4-BE49-F238E27FC236}">
-                <a16:creationId xmlns:a16="http://schemas.microsoft.com/office/drawing/2014/main" id="{2A170CC0-FD20-4B04-8E56-B6FCD3018D5C}"/>
-              </a:ext>
-            </a:extLst>
-          </p:cNvPr>
-          <p:cNvSpPr txBox="1"/>
-          <p:nvPr/>
-        </p:nvSpPr>
-        <p:spPr>
-          <a:xfrm>
-            <a:off x="2032144" y="2233084"/>
-            <a:ext cx="445956" cy="369332"/>
-          </a:xfrm>
-          <a:prstGeom prst="rect">
-            <a:avLst/>
-          </a:prstGeom>
-          <a:noFill/>
-        </p:spPr>
-        <p:txBody>
-          <a:bodyPr wrap="none" rtlCol="0">
-            <a:spAutoFit/>
-          </a:bodyPr>
-          <a:lstStyle/>
-          <a:p>
-            <a:r>
-              <a:rPr lang="en-US" dirty="0"/>
-              <a:t>DP</a:t>
-            </a:r>
-          </a:p>
-        </p:txBody>
-      </p:sp>
-      <p:sp>
-        <p:nvSpPr>
-          <p:cNvPr id="16" name="TextBox 15">
-            <a:extLst>
-              <a:ext uri="{FF2B5EF4-FFF2-40B4-BE49-F238E27FC236}">
-                <a16:creationId xmlns:a16="http://schemas.microsoft.com/office/drawing/2014/main" id="{AF4574C7-35F1-4C6A-A5F9-0EE1F98D5A88}"/>
-              </a:ext>
-            </a:extLst>
-          </p:cNvPr>
-          <p:cNvSpPr txBox="1"/>
-          <p:nvPr/>
-        </p:nvSpPr>
-        <p:spPr>
-          <a:xfrm>
-            <a:off x="2821038" y="1742168"/>
-            <a:ext cx="445956" cy="369332"/>
-          </a:xfrm>
-          <a:prstGeom prst="rect">
-            <a:avLst/>
-          </a:prstGeom>
-          <a:noFill/>
-        </p:spPr>
-        <p:txBody>
-          <a:bodyPr wrap="none" rtlCol="0">
-            <a:spAutoFit/>
-          </a:bodyPr>
-          <a:lstStyle/>
-          <a:p>
-            <a:r>
-              <a:rPr lang="en-US" dirty="0"/>
-              <a:t>DP</a:t>
-            </a:r>
-          </a:p>
-        </p:txBody>
-      </p:sp>
-      <p:sp>
-        <p:nvSpPr>
-          <p:cNvPr id="17" name="TextBox 16">
-            <a:extLst>
-              <a:ext uri="{FF2B5EF4-FFF2-40B4-BE49-F238E27FC236}">
-                <a16:creationId xmlns:a16="http://schemas.microsoft.com/office/drawing/2014/main" id="{50A9BCAC-460D-41C8-B156-73AA680D5584}"/>
-              </a:ext>
-            </a:extLst>
-          </p:cNvPr>
-          <p:cNvSpPr txBox="1"/>
-          <p:nvPr/>
-        </p:nvSpPr>
-        <p:spPr>
-          <a:xfrm>
-            <a:off x="2821038" y="2240723"/>
-            <a:ext cx="445956" cy="369332"/>
-          </a:xfrm>
-          <a:prstGeom prst="rect">
-            <a:avLst/>
-          </a:prstGeom>
-          <a:noFill/>
-        </p:spPr>
-        <p:txBody>
-          <a:bodyPr wrap="none" rtlCol="0">
-            <a:spAutoFit/>
-          </a:bodyPr>
-          <a:lstStyle/>
-          <a:p>
-            <a:r>
-              <a:rPr lang="en-US" dirty="0"/>
-              <a:t>DP</a:t>
-            </a:r>
-          </a:p>
-        </p:txBody>
-      </p:sp>
-      <p:sp>
-        <p:nvSpPr>
-          <p:cNvPr id="18" name="TextBox 17">
-            <a:extLst>
-              <a:ext uri="{FF2B5EF4-FFF2-40B4-BE49-F238E27FC236}">
-                <a16:creationId xmlns:a16="http://schemas.microsoft.com/office/drawing/2014/main" id="{90607DCE-C6B2-48F2-802D-87A89A7B42F3}"/>
-              </a:ext>
-            </a:extLst>
-          </p:cNvPr>
-          <p:cNvSpPr txBox="1"/>
-          <p:nvPr/>
-        </p:nvSpPr>
-        <p:spPr>
-          <a:xfrm>
-            <a:off x="3609932" y="1734529"/>
-            <a:ext cx="445956" cy="369332"/>
-          </a:xfrm>
-          <a:prstGeom prst="rect">
-            <a:avLst/>
-          </a:prstGeom>
-          <a:noFill/>
-        </p:spPr>
-        <p:txBody>
-          <a:bodyPr wrap="none" rtlCol="0">
-            <a:spAutoFit/>
-          </a:bodyPr>
-          <a:lstStyle/>
-          <a:p>
-            <a:r>
-              <a:rPr lang="en-US" dirty="0"/>
-              <a:t>DP</a:t>
-            </a:r>
-          </a:p>
-        </p:txBody>
-      </p:sp>
-      <p:sp>
-        <p:nvSpPr>
-          <p:cNvPr id="19" name="TextBox 18">
-            <a:extLst>
-              <a:ext uri="{FF2B5EF4-FFF2-40B4-BE49-F238E27FC236}">
-                <a16:creationId xmlns:a16="http://schemas.microsoft.com/office/drawing/2014/main" id="{07B708CC-49D0-43FC-961E-13BA2AEFBC54}"/>
-              </a:ext>
-            </a:extLst>
-          </p:cNvPr>
-          <p:cNvSpPr txBox="1"/>
-          <p:nvPr/>
-        </p:nvSpPr>
-        <p:spPr>
-          <a:xfrm>
-            <a:off x="3609932" y="2233084"/>
-            <a:ext cx="445956" cy="369332"/>
-          </a:xfrm>
-          <a:prstGeom prst="rect">
-            <a:avLst/>
-          </a:prstGeom>
-          <a:noFill/>
-        </p:spPr>
-        <p:txBody>
-          <a:bodyPr wrap="none" rtlCol="0">
-            <a:spAutoFit/>
-          </a:bodyPr>
-          <a:lstStyle/>
-          <a:p>
-            <a:r>
-              <a:rPr lang="en-US" dirty="0"/>
-              <a:t>DP</a:t>
-            </a:r>
-          </a:p>
-        </p:txBody>
-      </p:sp>
-      <p:sp>
-        <p:nvSpPr>
-          <p:cNvPr id="20" name="TextBox 19">
-            <a:extLst>
-              <a:ext uri="{FF2B5EF4-FFF2-40B4-BE49-F238E27FC236}">
-                <a16:creationId xmlns:a16="http://schemas.microsoft.com/office/drawing/2014/main" id="{20DF13F7-1F50-4C8E-8002-C68789F436E6}"/>
-              </a:ext>
-            </a:extLst>
-          </p:cNvPr>
-          <p:cNvSpPr txBox="1"/>
-          <p:nvPr/>
-        </p:nvSpPr>
-        <p:spPr>
-          <a:xfrm>
-            <a:off x="4398826" y="1734529"/>
-            <a:ext cx="445956" cy="369332"/>
-          </a:xfrm>
-          <a:prstGeom prst="rect">
-            <a:avLst/>
-          </a:prstGeom>
-          <a:noFill/>
-        </p:spPr>
-        <p:txBody>
-          <a:bodyPr wrap="none" rtlCol="0">
-            <a:spAutoFit/>
-          </a:bodyPr>
-          <a:lstStyle/>
-          <a:p>
-            <a:r>
-              <a:rPr lang="en-US" dirty="0"/>
-              <a:t>DP</a:t>
-            </a:r>
-          </a:p>
-        </p:txBody>
-      </p:sp>
-      <p:sp>
-        <p:nvSpPr>
-          <p:cNvPr id="21" name="TextBox 20">
-            <a:extLst>
-              <a:ext uri="{FF2B5EF4-FFF2-40B4-BE49-F238E27FC236}">
-                <a16:creationId xmlns:a16="http://schemas.microsoft.com/office/drawing/2014/main" id="{54F79A1B-37CA-4501-AFEB-F611D34B9FCE}"/>
-              </a:ext>
-            </a:extLst>
-          </p:cNvPr>
-          <p:cNvSpPr txBox="1"/>
-          <p:nvPr/>
-        </p:nvSpPr>
-        <p:spPr>
-          <a:xfrm>
-            <a:off x="4398826" y="2233084"/>
-            <a:ext cx="445956" cy="369332"/>
-          </a:xfrm>
-          <a:prstGeom prst="rect">
-            <a:avLst/>
-          </a:prstGeom>
-          <a:noFill/>
-        </p:spPr>
-        <p:txBody>
-          <a:bodyPr wrap="none" rtlCol="0">
-            <a:spAutoFit/>
-          </a:bodyPr>
-          <a:lstStyle/>
-          <a:p>
-            <a:r>
-              <a:rPr lang="en-US" dirty="0"/>
-              <a:t>DP</a:t>
-            </a:r>
-          </a:p>
-        </p:txBody>
-      </p:sp>
-      <p:sp>
-        <p:nvSpPr>
-          <p:cNvPr id="22" name="TextBox 21">
-            <a:extLst>
-              <a:ext uri="{FF2B5EF4-FFF2-40B4-BE49-F238E27FC236}">
-                <a16:creationId xmlns:a16="http://schemas.microsoft.com/office/drawing/2014/main" id="{ECECC4AE-0EA8-453E-BA95-DD2DF7B5DED9}"/>
-              </a:ext>
-            </a:extLst>
-          </p:cNvPr>
-          <p:cNvSpPr txBox="1"/>
-          <p:nvPr/>
-        </p:nvSpPr>
-        <p:spPr>
-          <a:xfrm>
-            <a:off x="5187720" y="1742168"/>
-            <a:ext cx="445956" cy="369332"/>
-          </a:xfrm>
-          <a:prstGeom prst="rect">
-            <a:avLst/>
-          </a:prstGeom>
-          <a:noFill/>
-        </p:spPr>
-        <p:txBody>
-          <a:bodyPr wrap="none" rtlCol="0">
-            <a:spAutoFit/>
-          </a:bodyPr>
-          <a:lstStyle/>
-          <a:p>
-            <a:r>
-              <a:rPr lang="en-US" dirty="0"/>
-              <a:t>DP</a:t>
-            </a:r>
-          </a:p>
-        </p:txBody>
-      </p:sp>
-      <p:sp>
-        <p:nvSpPr>
-          <p:cNvPr id="23" name="TextBox 22">
-            <a:extLst>
-              <a:ext uri="{FF2B5EF4-FFF2-40B4-BE49-F238E27FC236}">
-                <a16:creationId xmlns:a16="http://schemas.microsoft.com/office/drawing/2014/main" id="{55E8DA3E-B081-4911-9C31-BC6FA048C135}"/>
-              </a:ext>
-            </a:extLst>
-          </p:cNvPr>
-          <p:cNvSpPr txBox="1"/>
-          <p:nvPr/>
-        </p:nvSpPr>
-        <p:spPr>
-          <a:xfrm>
-            <a:off x="5187720" y="2240723"/>
-            <a:ext cx="445956" cy="369332"/>
-          </a:xfrm>
-          <a:prstGeom prst="rect">
-            <a:avLst/>
-          </a:prstGeom>
-          <a:noFill/>
-        </p:spPr>
-        <p:txBody>
-          <a:bodyPr wrap="none" rtlCol="0">
-            <a:spAutoFit/>
-          </a:bodyPr>
-          <a:lstStyle/>
-          <a:p>
-            <a:r>
-              <a:rPr lang="en-US" dirty="0"/>
-              <a:t>DP</a:t>
-            </a:r>
-          </a:p>
-        </p:txBody>
-      </p:sp>
-      <p:sp>
-        <p:nvSpPr>
-          <p:cNvPr id="24" name="TextBox 23">
-            <a:extLst>
-              <a:ext uri="{FF2B5EF4-FFF2-40B4-BE49-F238E27FC236}">
-                <a16:creationId xmlns:a16="http://schemas.microsoft.com/office/drawing/2014/main" id="{14224505-7DD5-4FB5-862E-DCFAB8909F9F}"/>
-              </a:ext>
-            </a:extLst>
-          </p:cNvPr>
-          <p:cNvSpPr txBox="1"/>
-          <p:nvPr/>
-        </p:nvSpPr>
-        <p:spPr>
-          <a:xfrm>
-            <a:off x="6542530" y="1742168"/>
-            <a:ext cx="445956" cy="369332"/>
-          </a:xfrm>
-          <a:prstGeom prst="rect">
-            <a:avLst/>
-          </a:prstGeom>
-          <a:noFill/>
-        </p:spPr>
-        <p:txBody>
-          <a:bodyPr wrap="none" rtlCol="0">
-            <a:spAutoFit/>
-          </a:bodyPr>
-          <a:lstStyle/>
-          <a:p>
-            <a:r>
-              <a:rPr lang="en-US" dirty="0"/>
-              <a:t>DP</a:t>
-            </a:r>
-          </a:p>
-        </p:txBody>
-      </p:sp>
-      <p:sp>
-        <p:nvSpPr>
-          <p:cNvPr id="25" name="TextBox 24">
-            <a:extLst>
-              <a:ext uri="{FF2B5EF4-FFF2-40B4-BE49-F238E27FC236}">
-                <a16:creationId xmlns:a16="http://schemas.microsoft.com/office/drawing/2014/main" id="{0F4C4247-FAE5-447E-BC45-638613D57752}"/>
-              </a:ext>
-            </a:extLst>
-          </p:cNvPr>
-          <p:cNvSpPr txBox="1"/>
-          <p:nvPr/>
-        </p:nvSpPr>
-        <p:spPr>
-          <a:xfrm>
-            <a:off x="6542530" y="2240723"/>
-            <a:ext cx="445956" cy="369332"/>
-          </a:xfrm>
-          <a:prstGeom prst="rect">
-            <a:avLst/>
-          </a:prstGeom>
-          <a:noFill/>
-        </p:spPr>
-        <p:txBody>
-          <a:bodyPr wrap="none" rtlCol="0">
-            <a:spAutoFit/>
-          </a:bodyPr>
-          <a:lstStyle/>
-          <a:p>
-            <a:r>
-              <a:rPr lang="en-US" dirty="0"/>
-              <a:t>DP</a:t>
-            </a:r>
-          </a:p>
-        </p:txBody>
-      </p:sp>
-      <p:sp>
-        <p:nvSpPr>
-          <p:cNvPr id="26" name="TextBox 25">
-            <a:extLst>
-              <a:ext uri="{FF2B5EF4-FFF2-40B4-BE49-F238E27FC236}">
-                <a16:creationId xmlns:a16="http://schemas.microsoft.com/office/drawing/2014/main" id="{F9B90AFD-CE60-48BE-9CB1-88DC3242FE05}"/>
-              </a:ext>
-            </a:extLst>
-          </p:cNvPr>
-          <p:cNvSpPr txBox="1"/>
-          <p:nvPr/>
-        </p:nvSpPr>
-        <p:spPr>
-          <a:xfrm>
-            <a:off x="7323333" y="1734529"/>
-            <a:ext cx="445956" cy="369332"/>
-          </a:xfrm>
-          <a:prstGeom prst="rect">
-            <a:avLst/>
-          </a:prstGeom>
-          <a:noFill/>
-        </p:spPr>
-        <p:txBody>
-          <a:bodyPr wrap="none" rtlCol="0">
-            <a:spAutoFit/>
-          </a:bodyPr>
-          <a:lstStyle/>
-          <a:p>
-            <a:r>
-              <a:rPr lang="en-US" dirty="0"/>
-              <a:t>DP</a:t>
-            </a:r>
-          </a:p>
-        </p:txBody>
-      </p:sp>
-      <p:sp>
-        <p:nvSpPr>
-          <p:cNvPr id="27" name="TextBox 26">
-            <a:extLst>
-              <a:ext uri="{FF2B5EF4-FFF2-40B4-BE49-F238E27FC236}">
-                <a16:creationId xmlns:a16="http://schemas.microsoft.com/office/drawing/2014/main" id="{58EAF9D2-7B67-44FE-AD9E-18AA7335630A}"/>
-              </a:ext>
-            </a:extLst>
-          </p:cNvPr>
-          <p:cNvSpPr txBox="1"/>
-          <p:nvPr/>
-        </p:nvSpPr>
-        <p:spPr>
-          <a:xfrm>
-            <a:off x="7323333" y="2233084"/>
-            <a:ext cx="445956" cy="369332"/>
-          </a:xfrm>
-          <a:prstGeom prst="rect">
-            <a:avLst/>
-          </a:prstGeom>
-          <a:noFill/>
-        </p:spPr>
-        <p:txBody>
-          <a:bodyPr wrap="none" rtlCol="0">
-            <a:spAutoFit/>
-          </a:bodyPr>
-          <a:lstStyle/>
-          <a:p>
-            <a:r>
-              <a:rPr lang="en-US" dirty="0"/>
-              <a:t>DP</a:t>
-            </a:r>
-          </a:p>
-        </p:txBody>
-      </p:sp>
-      <p:sp>
-        <p:nvSpPr>
-          <p:cNvPr id="28" name="TextBox 27">
-            <a:extLst>
-              <a:ext uri="{FF2B5EF4-FFF2-40B4-BE49-F238E27FC236}">
-                <a16:creationId xmlns:a16="http://schemas.microsoft.com/office/drawing/2014/main" id="{83FC9C77-3B44-4BAF-B280-EC5D2E08A10D}"/>
-              </a:ext>
-            </a:extLst>
-          </p:cNvPr>
-          <p:cNvSpPr txBox="1"/>
-          <p:nvPr/>
-        </p:nvSpPr>
-        <p:spPr>
-          <a:xfrm>
-            <a:off x="8136114" y="1734529"/>
-            <a:ext cx="445956" cy="369332"/>
-          </a:xfrm>
-          <a:prstGeom prst="rect">
-            <a:avLst/>
-          </a:prstGeom>
-          <a:noFill/>
-        </p:spPr>
-        <p:txBody>
-          <a:bodyPr wrap="none" rtlCol="0">
-            <a:spAutoFit/>
-          </a:bodyPr>
-          <a:lstStyle/>
-          <a:p>
-            <a:r>
-              <a:rPr lang="en-US" dirty="0"/>
-              <a:t>DP</a:t>
-            </a:r>
-          </a:p>
-        </p:txBody>
-      </p:sp>
-      <p:sp>
-        <p:nvSpPr>
-          <p:cNvPr id="29" name="TextBox 28">
-            <a:extLst>
-              <a:ext uri="{FF2B5EF4-FFF2-40B4-BE49-F238E27FC236}">
-                <a16:creationId xmlns:a16="http://schemas.microsoft.com/office/drawing/2014/main" id="{5005B689-D33B-4FE2-B34D-B30BF1CA6450}"/>
-              </a:ext>
-            </a:extLst>
-          </p:cNvPr>
-          <p:cNvSpPr txBox="1"/>
-          <p:nvPr/>
-        </p:nvSpPr>
-        <p:spPr>
-          <a:xfrm>
-            <a:off x="8136114" y="2233084"/>
-            <a:ext cx="445956" cy="369332"/>
-          </a:xfrm>
-          <a:prstGeom prst="rect">
-            <a:avLst/>
-          </a:prstGeom>
-          <a:noFill/>
-        </p:spPr>
-        <p:txBody>
-          <a:bodyPr wrap="none" rtlCol="0">
-            <a:spAutoFit/>
-          </a:bodyPr>
-          <a:lstStyle/>
-          <a:p>
-            <a:r>
-              <a:rPr lang="en-US" dirty="0"/>
-              <a:t>DP</a:t>
-            </a:r>
-          </a:p>
-        </p:txBody>
-      </p:sp>
-      <p:sp>
-        <p:nvSpPr>
-          <p:cNvPr id="30" name="TextBox 29">
-            <a:extLst>
-              <a:ext uri="{FF2B5EF4-FFF2-40B4-BE49-F238E27FC236}">
-                <a16:creationId xmlns:a16="http://schemas.microsoft.com/office/drawing/2014/main" id="{F8ADDCBB-4266-42A9-BA96-51DACB92A312}"/>
-              </a:ext>
-            </a:extLst>
-          </p:cNvPr>
-          <p:cNvSpPr txBox="1"/>
-          <p:nvPr/>
-        </p:nvSpPr>
-        <p:spPr>
-          <a:xfrm>
-            <a:off x="8927976" y="1734529"/>
-            <a:ext cx="445956" cy="369332"/>
-          </a:xfrm>
-          <a:prstGeom prst="rect">
-            <a:avLst/>
-          </a:prstGeom>
-          <a:noFill/>
-        </p:spPr>
-        <p:txBody>
-          <a:bodyPr wrap="none" rtlCol="0">
-            <a:spAutoFit/>
-          </a:bodyPr>
-          <a:lstStyle/>
-          <a:p>
-            <a:r>
-              <a:rPr lang="en-US" dirty="0"/>
-              <a:t>DP</a:t>
-            </a:r>
-          </a:p>
-        </p:txBody>
-      </p:sp>
-      <p:sp>
-        <p:nvSpPr>
-          <p:cNvPr id="31" name="TextBox 30">
-            <a:extLst>
-              <a:ext uri="{FF2B5EF4-FFF2-40B4-BE49-F238E27FC236}">
-                <a16:creationId xmlns:a16="http://schemas.microsoft.com/office/drawing/2014/main" id="{D23EEC7E-5E18-4E10-BEFF-E2B97BCD51CB}"/>
-              </a:ext>
-            </a:extLst>
-          </p:cNvPr>
-          <p:cNvSpPr txBox="1"/>
-          <p:nvPr/>
-        </p:nvSpPr>
-        <p:spPr>
-          <a:xfrm>
-            <a:off x="8927976" y="2233084"/>
-            <a:ext cx="445956" cy="369332"/>
-          </a:xfrm>
-          <a:prstGeom prst="rect">
-            <a:avLst/>
-          </a:prstGeom>
-          <a:noFill/>
-        </p:spPr>
-        <p:txBody>
-          <a:bodyPr wrap="none" rtlCol="0">
-            <a:spAutoFit/>
-          </a:bodyPr>
-          <a:lstStyle/>
-          <a:p>
-            <a:r>
-              <a:rPr lang="en-US" dirty="0"/>
-              <a:t>DP</a:t>
-            </a:r>
-          </a:p>
-        </p:txBody>
-      </p:sp>
-      <p:sp>
-        <p:nvSpPr>
-          <p:cNvPr id="32" name="TextBox 31">
-            <a:extLst>
-              <a:ext uri="{FF2B5EF4-FFF2-40B4-BE49-F238E27FC236}">
-                <a16:creationId xmlns:a16="http://schemas.microsoft.com/office/drawing/2014/main" id="{40988648-C6EA-4901-8632-92B3779842A6}"/>
-              </a:ext>
-            </a:extLst>
-          </p:cNvPr>
-          <p:cNvSpPr txBox="1"/>
-          <p:nvPr/>
-        </p:nvSpPr>
-        <p:spPr>
-          <a:xfrm>
-            <a:off x="9724952" y="1742168"/>
-            <a:ext cx="445956" cy="369332"/>
-          </a:xfrm>
-          <a:prstGeom prst="rect">
-            <a:avLst/>
-          </a:prstGeom>
-          <a:noFill/>
-        </p:spPr>
-        <p:txBody>
-          <a:bodyPr wrap="none" rtlCol="0">
-            <a:spAutoFit/>
-          </a:bodyPr>
-          <a:lstStyle/>
-          <a:p>
-            <a:r>
-              <a:rPr lang="en-US" dirty="0"/>
-              <a:t>DP</a:t>
-            </a:r>
-          </a:p>
-        </p:txBody>
-      </p:sp>
-      <p:sp>
-        <p:nvSpPr>
-          <p:cNvPr id="33" name="TextBox 32">
-            <a:extLst>
-              <a:ext uri="{FF2B5EF4-FFF2-40B4-BE49-F238E27FC236}">
-                <a16:creationId xmlns:a16="http://schemas.microsoft.com/office/drawing/2014/main" id="{FC7719FA-F87C-4070-BCF4-CC8E75591837}"/>
-              </a:ext>
-            </a:extLst>
-          </p:cNvPr>
-          <p:cNvSpPr txBox="1"/>
-          <p:nvPr/>
-        </p:nvSpPr>
-        <p:spPr>
-          <a:xfrm>
-            <a:off x="9724952" y="2240723"/>
-            <a:ext cx="445956" cy="369332"/>
-          </a:xfrm>
-          <a:prstGeom prst="rect">
-            <a:avLst/>
-          </a:prstGeom>
-          <a:noFill/>
-        </p:spPr>
-        <p:txBody>
-          <a:bodyPr wrap="none" rtlCol="0">
-            <a:spAutoFit/>
-          </a:bodyPr>
-          <a:lstStyle/>
-          <a:p>
-            <a:r>
-              <a:rPr lang="en-US" dirty="0"/>
-              <a:t>DP</a:t>
-            </a:r>
-          </a:p>
-        </p:txBody>
-      </p:sp>
-      <p:sp>
-        <p:nvSpPr>
-          <p:cNvPr id="34" name="TextBox 33">
-            <a:extLst>
-              <a:ext uri="{FF2B5EF4-FFF2-40B4-BE49-F238E27FC236}">
-                <a16:creationId xmlns:a16="http://schemas.microsoft.com/office/drawing/2014/main" id="{DFF20746-5F3B-405C-920E-37872AA57DA2}"/>
-              </a:ext>
-            </a:extLst>
-          </p:cNvPr>
-          <p:cNvSpPr txBox="1"/>
-          <p:nvPr/>
-        </p:nvSpPr>
-        <p:spPr>
-          <a:xfrm>
-            <a:off x="10516814" y="1742168"/>
-            <a:ext cx="445956" cy="369332"/>
-          </a:xfrm>
-          <a:prstGeom prst="rect">
-            <a:avLst/>
-          </a:prstGeom>
-          <a:noFill/>
-        </p:spPr>
-        <p:txBody>
-          <a:bodyPr wrap="none" rtlCol="0">
-            <a:spAutoFit/>
-          </a:bodyPr>
-          <a:lstStyle/>
-          <a:p>
-            <a:r>
-              <a:rPr lang="en-US" dirty="0"/>
-              <a:t>DP</a:t>
-            </a:r>
-          </a:p>
-        </p:txBody>
-      </p:sp>
-      <p:sp>
-        <p:nvSpPr>
-          <p:cNvPr id="35" name="TextBox 34">
-            <a:extLst>
-              <a:ext uri="{FF2B5EF4-FFF2-40B4-BE49-F238E27FC236}">
-                <a16:creationId xmlns:a16="http://schemas.microsoft.com/office/drawing/2014/main" id="{EF60B1F4-CC08-4852-B6BD-59E019BD9CC4}"/>
-              </a:ext>
-            </a:extLst>
-          </p:cNvPr>
-          <p:cNvSpPr txBox="1"/>
-          <p:nvPr/>
-        </p:nvSpPr>
-        <p:spPr>
-          <a:xfrm>
-            <a:off x="10516814" y="2240723"/>
-            <a:ext cx="445956" cy="369332"/>
-          </a:xfrm>
-          <a:prstGeom prst="rect">
-            <a:avLst/>
-          </a:prstGeom>
-          <a:noFill/>
-        </p:spPr>
-        <p:txBody>
-          <a:bodyPr wrap="none" rtlCol="0">
-            <a:spAutoFit/>
-          </a:bodyPr>
-          <a:lstStyle/>
-          <a:p>
-            <a:r>
-              <a:rPr lang="en-US" dirty="0"/>
-              <a:t>DP</a:t>
-            </a:r>
-          </a:p>
-        </p:txBody>
-      </p:sp>
-      <p:sp>
-        <p:nvSpPr>
-          <p:cNvPr id="36" name="TextBox 35">
-            <a:extLst>
-              <a:ext uri="{FF2B5EF4-FFF2-40B4-BE49-F238E27FC236}">
-                <a16:creationId xmlns:a16="http://schemas.microsoft.com/office/drawing/2014/main" id="{A6D88593-F6E6-4392-AD23-98ABE19AF662}"/>
-              </a:ext>
-            </a:extLst>
-          </p:cNvPr>
-          <p:cNvSpPr txBox="1"/>
-          <p:nvPr/>
-        </p:nvSpPr>
-        <p:spPr>
-          <a:xfrm>
-            <a:off x="2699955" y="937384"/>
-            <a:ext cx="1529585" cy="184666"/>
-          </a:xfrm>
-          <a:prstGeom prst="rect">
-            <a:avLst/>
-          </a:prstGeom>
-          <a:noFill/>
-        </p:spPr>
-        <p:txBody>
-          <a:bodyPr wrap="none" rtlCol="0">
-            <a:spAutoFit/>
-          </a:bodyPr>
-          <a:lstStyle/>
-          <a:p>
-            <a:pPr algn="ctr"/>
-            <a:r>
-              <a:rPr lang="en-US" sz="600" b="1" i="0" dirty="0">
-                <a:solidFill>
-                  <a:srgbClr val="222222"/>
-                </a:solidFill>
-                <a:effectLst/>
-                <a:latin typeface="Arial" panose="020B0604020202020204" pitchFamily="34" charset="0"/>
-              </a:rPr>
-              <a:t>ERF8-050-01-L-D-EM2-TR  connector</a:t>
-            </a:r>
-            <a:endParaRPr lang="en-US" sz="600" b="1" dirty="0"/>
-          </a:p>
-        </p:txBody>
-      </p:sp>
-      <p:sp>
-        <p:nvSpPr>
-          <p:cNvPr id="37" name="TextBox 36">
-            <a:extLst>
-              <a:ext uri="{FF2B5EF4-FFF2-40B4-BE49-F238E27FC236}">
-                <a16:creationId xmlns:a16="http://schemas.microsoft.com/office/drawing/2014/main" id="{A6A65D26-1F48-4050-A18B-260829D45EE8}"/>
-              </a:ext>
-            </a:extLst>
-          </p:cNvPr>
-          <p:cNvSpPr txBox="1"/>
-          <p:nvPr/>
-        </p:nvSpPr>
-        <p:spPr>
-          <a:xfrm>
-            <a:off x="7990609" y="939545"/>
-            <a:ext cx="1529585" cy="184666"/>
-          </a:xfrm>
-          <a:prstGeom prst="rect">
-            <a:avLst/>
-          </a:prstGeom>
-          <a:noFill/>
-        </p:spPr>
-        <p:txBody>
-          <a:bodyPr wrap="none" rtlCol="0">
-            <a:spAutoFit/>
-          </a:bodyPr>
-          <a:lstStyle/>
-          <a:p>
-            <a:pPr algn="ctr"/>
-            <a:r>
-              <a:rPr lang="en-US" sz="600" b="1" i="0" dirty="0">
-                <a:solidFill>
-                  <a:srgbClr val="222222"/>
-                </a:solidFill>
-                <a:effectLst/>
-                <a:latin typeface="Arial" panose="020B0604020202020204" pitchFamily="34" charset="0"/>
-              </a:rPr>
-              <a:t>ERF8-050-01-L-D-EM2-TR  connector</a:t>
-            </a:r>
-            <a:endParaRPr lang="en-US" sz="600" b="1" dirty="0"/>
-          </a:p>
-        </p:txBody>
-      </p:sp>
-      <p:sp>
-        <p:nvSpPr>
-          <p:cNvPr id="38" name="TextBox 37">
-            <a:extLst>
-              <a:ext uri="{FF2B5EF4-FFF2-40B4-BE49-F238E27FC236}">
-                <a16:creationId xmlns:a16="http://schemas.microsoft.com/office/drawing/2014/main" id="{FAB688A6-102A-4A64-9750-DB6C56B9D8AF}"/>
-              </a:ext>
-            </a:extLst>
-          </p:cNvPr>
-          <p:cNvSpPr txBox="1"/>
-          <p:nvPr/>
-        </p:nvSpPr>
-        <p:spPr>
-          <a:xfrm>
-            <a:off x="2671806" y="3244334"/>
-            <a:ext cx="1529585" cy="184666"/>
-          </a:xfrm>
-          <a:prstGeom prst="rect">
-            <a:avLst/>
-          </a:prstGeom>
-          <a:noFill/>
-        </p:spPr>
-        <p:txBody>
-          <a:bodyPr wrap="none" rtlCol="0">
-            <a:spAutoFit/>
-          </a:bodyPr>
-          <a:lstStyle/>
-          <a:p>
-            <a:pPr algn="ctr"/>
-            <a:r>
-              <a:rPr lang="en-US" sz="600" b="1" i="0" dirty="0">
-                <a:solidFill>
-                  <a:srgbClr val="222222"/>
-                </a:solidFill>
-                <a:effectLst/>
-                <a:latin typeface="Arial" panose="020B0604020202020204" pitchFamily="34" charset="0"/>
-              </a:rPr>
-              <a:t>ERF8-050-01-L-D-EM2-TR  connector</a:t>
-            </a:r>
-            <a:endParaRPr lang="en-US" sz="600" b="1" dirty="0"/>
-          </a:p>
-        </p:txBody>
-      </p:sp>
-      <p:sp>
-        <p:nvSpPr>
-          <p:cNvPr id="39" name="TextBox 38">
-            <a:extLst>
-              <a:ext uri="{FF2B5EF4-FFF2-40B4-BE49-F238E27FC236}">
-                <a16:creationId xmlns:a16="http://schemas.microsoft.com/office/drawing/2014/main" id="{F4A834BF-751F-4DA2-89A9-296188348627}"/>
-              </a:ext>
-            </a:extLst>
-          </p:cNvPr>
-          <p:cNvSpPr txBox="1"/>
-          <p:nvPr/>
-        </p:nvSpPr>
-        <p:spPr>
-          <a:xfrm>
-            <a:off x="7954748" y="3244334"/>
-            <a:ext cx="1529585" cy="184666"/>
-          </a:xfrm>
-          <a:prstGeom prst="rect">
-            <a:avLst/>
-          </a:prstGeom>
-          <a:noFill/>
-        </p:spPr>
-        <p:txBody>
-          <a:bodyPr wrap="none" rtlCol="0">
-            <a:spAutoFit/>
-          </a:bodyPr>
-          <a:lstStyle/>
-          <a:p>
-            <a:pPr algn="ctr"/>
-            <a:r>
-              <a:rPr lang="en-US" sz="600" b="1" i="0" dirty="0">
-                <a:solidFill>
-                  <a:srgbClr val="222222"/>
-                </a:solidFill>
-                <a:effectLst/>
-                <a:latin typeface="Arial" panose="020B0604020202020204" pitchFamily="34" charset="0"/>
-              </a:rPr>
-              <a:t>ERF8-050-01-L-D-EM2-TR  connector</a:t>
-            </a:r>
-            <a:endParaRPr lang="en-US" sz="600" b="1" dirty="0"/>
-          </a:p>
-        </p:txBody>
-      </p:sp>
-      <p:sp>
-        <p:nvSpPr>
-          <p:cNvPr id="40" name="TextBox 39">
-            <a:extLst>
-              <a:ext uri="{FF2B5EF4-FFF2-40B4-BE49-F238E27FC236}">
-                <a16:creationId xmlns:a16="http://schemas.microsoft.com/office/drawing/2014/main" id="{EEEB97F2-8B17-422E-A2FC-FE60A736A43D}"/>
-              </a:ext>
-            </a:extLst>
-          </p:cNvPr>
-          <p:cNvSpPr txBox="1"/>
-          <p:nvPr/>
-        </p:nvSpPr>
-        <p:spPr>
-          <a:xfrm>
-            <a:off x="2699955" y="4041479"/>
-            <a:ext cx="1529585" cy="184666"/>
-          </a:xfrm>
-          <a:prstGeom prst="rect">
-            <a:avLst/>
-          </a:prstGeom>
-          <a:noFill/>
-        </p:spPr>
-        <p:txBody>
-          <a:bodyPr wrap="none" rtlCol="0">
-            <a:spAutoFit/>
-          </a:bodyPr>
-          <a:lstStyle/>
-          <a:p>
-            <a:pPr algn="ctr"/>
-            <a:r>
-              <a:rPr lang="en-US" sz="600" b="1" i="0" dirty="0">
-                <a:solidFill>
-                  <a:srgbClr val="222222"/>
-                </a:solidFill>
-                <a:effectLst/>
-                <a:latin typeface="Arial" panose="020B0604020202020204" pitchFamily="34" charset="0"/>
-              </a:rPr>
-              <a:t>ERF8-050-01-L-D-EM2-TR  connector</a:t>
-            </a:r>
-            <a:endParaRPr lang="en-US" sz="600" b="1" dirty="0"/>
-          </a:p>
-        </p:txBody>
-      </p:sp>
-      <p:sp>
-        <p:nvSpPr>
-          <p:cNvPr id="41" name="TextBox 40">
-            <a:extLst>
-              <a:ext uri="{FF2B5EF4-FFF2-40B4-BE49-F238E27FC236}">
-                <a16:creationId xmlns:a16="http://schemas.microsoft.com/office/drawing/2014/main" id="{ABC17EEA-4046-4DE9-B229-9D8D74A44069}"/>
-              </a:ext>
-            </a:extLst>
-          </p:cNvPr>
-          <p:cNvSpPr txBox="1"/>
-          <p:nvPr/>
-        </p:nvSpPr>
-        <p:spPr>
-          <a:xfrm>
-            <a:off x="7990608" y="4039318"/>
-            <a:ext cx="1529585" cy="184666"/>
-          </a:xfrm>
-          <a:prstGeom prst="rect">
-            <a:avLst/>
-          </a:prstGeom>
-          <a:noFill/>
-        </p:spPr>
-        <p:txBody>
-          <a:bodyPr wrap="none" rtlCol="0">
-            <a:spAutoFit/>
-          </a:bodyPr>
-          <a:lstStyle/>
-          <a:p>
-            <a:pPr algn="ctr"/>
-            <a:r>
-              <a:rPr lang="en-US" sz="600" b="1" i="0" dirty="0">
-                <a:solidFill>
-                  <a:srgbClr val="222222"/>
-                </a:solidFill>
-                <a:effectLst/>
-                <a:latin typeface="Arial" panose="020B0604020202020204" pitchFamily="34" charset="0"/>
-              </a:rPr>
-              <a:t>ERF8-050-01-L-D-EM2-TR  connector</a:t>
-            </a:r>
-            <a:endParaRPr lang="en-US" sz="600" b="1" dirty="0"/>
-          </a:p>
-        </p:txBody>
-      </p:sp>
-      <p:sp>
-        <p:nvSpPr>
-          <p:cNvPr id="42" name="TextBox 41">
-            <a:extLst>
-              <a:ext uri="{FF2B5EF4-FFF2-40B4-BE49-F238E27FC236}">
-                <a16:creationId xmlns:a16="http://schemas.microsoft.com/office/drawing/2014/main" id="{14F04E3F-C14B-40F8-A520-7571AFA8E5A3}"/>
-              </a:ext>
-            </a:extLst>
-          </p:cNvPr>
-          <p:cNvSpPr txBox="1"/>
-          <p:nvPr/>
-        </p:nvSpPr>
-        <p:spPr>
-          <a:xfrm>
-            <a:off x="2699955" y="6301299"/>
-            <a:ext cx="1529585" cy="184666"/>
-          </a:xfrm>
-          <a:prstGeom prst="rect">
-            <a:avLst/>
-          </a:prstGeom>
-          <a:noFill/>
-        </p:spPr>
-        <p:txBody>
-          <a:bodyPr wrap="none" rtlCol="0">
-            <a:spAutoFit/>
-          </a:bodyPr>
-          <a:lstStyle/>
-          <a:p>
-            <a:pPr algn="ctr"/>
-            <a:r>
-              <a:rPr lang="en-US" sz="600" b="1" i="0" dirty="0">
-                <a:solidFill>
-                  <a:srgbClr val="222222"/>
-                </a:solidFill>
-                <a:effectLst/>
-                <a:latin typeface="Arial" panose="020B0604020202020204" pitchFamily="34" charset="0"/>
-              </a:rPr>
-              <a:t>ERF8-050-01-L-D-EM2-TR  connector</a:t>
-            </a:r>
-            <a:endParaRPr lang="en-US" sz="600" b="1" dirty="0"/>
-          </a:p>
-        </p:txBody>
-      </p:sp>
-      <p:sp>
-        <p:nvSpPr>
-          <p:cNvPr id="43" name="TextBox 42">
-            <a:extLst>
-              <a:ext uri="{FF2B5EF4-FFF2-40B4-BE49-F238E27FC236}">
-                <a16:creationId xmlns:a16="http://schemas.microsoft.com/office/drawing/2014/main" id="{CF0A99EE-068C-48D1-A07A-FB435005A64D}"/>
-              </a:ext>
-            </a:extLst>
-          </p:cNvPr>
-          <p:cNvSpPr txBox="1"/>
-          <p:nvPr/>
-        </p:nvSpPr>
-        <p:spPr>
-          <a:xfrm>
-            <a:off x="7990608" y="6301299"/>
-            <a:ext cx="1529585" cy="184666"/>
-          </a:xfrm>
-          <a:prstGeom prst="rect">
-            <a:avLst/>
-          </a:prstGeom>
-          <a:noFill/>
-        </p:spPr>
-        <p:txBody>
-          <a:bodyPr wrap="none" rtlCol="0">
-            <a:spAutoFit/>
-          </a:bodyPr>
-          <a:lstStyle/>
-          <a:p>
-            <a:pPr algn="ctr"/>
-            <a:r>
-              <a:rPr lang="en-US" sz="600" b="1" i="0" dirty="0">
-                <a:solidFill>
-                  <a:srgbClr val="222222"/>
-                </a:solidFill>
-                <a:effectLst/>
-                <a:latin typeface="Arial" panose="020B0604020202020204" pitchFamily="34" charset="0"/>
-              </a:rPr>
-              <a:t>ERF8-050-01-L-D-EM2-TR  connector</a:t>
-            </a:r>
-            <a:endParaRPr lang="en-US" sz="600" b="1" dirty="0"/>
-          </a:p>
-        </p:txBody>
-      </p:sp>
-    </p:spTree>
-    <p:extLst>
-      <p:ext uri="{BB962C8B-B14F-4D97-AF65-F5344CB8AC3E}">
-        <p14:creationId xmlns:p14="http://schemas.microsoft.com/office/powerpoint/2010/main" val="1088427201"/>
-      </p:ext>
-    </p:extLst>
-  </p:cSld>
-  <p:clrMapOvr>
-    <a:masterClrMapping/>
-  </p:clrMapOvr>
-</p:sld>
-</file>
-
 <file path=ppt/theme/theme1.xml><?xml version="1.0" encoding="utf-8"?>
 <a:theme xmlns:a="http://schemas.openxmlformats.org/drawingml/2006/main" name="Office Theme">
   <a:themeElements>

</xml_diff>